<commit_message>
Added transitions to PowerPoint
</commit_message>
<xml_diff>
--- a/Presentation.pptx
+++ b/Presentation.pptx
@@ -20,8 +20,8 @@
     <p:sldId id="264" r:id="rId11"/>
     <p:sldId id="267" r:id="rId12"/>
     <p:sldId id="269" r:id="rId13"/>
-    <p:sldId id="271" r:id="rId14"/>
-    <p:sldId id="270" r:id="rId15"/>
+    <p:sldId id="270" r:id="rId14"/>
+    <p:sldId id="271" r:id="rId15"/>
     <p:sldId id="272" r:id="rId16"/>
   </p:sldIdLst>
   <p:sldSz cx="12192000" cy="6858000"/>
@@ -123,7 +123,7 @@
   </p:defaultTextStyle>
   <p:extLst>
     <p:ext uri="{EFAFB233-063F-42B5-8137-9DF3F51BA10A}">
-      <p15:sldGuideLst xmlns:p15="http://schemas.microsoft.com/office/powerpoint/2012/main" xmlns=""/>
+      <p15:sldGuideLst xmlns="" xmlns:p15="http://schemas.microsoft.com/office/powerpoint/2012/main"/>
     </p:ext>
   </p:extLst>
 </p:presentation>
@@ -2040,8 +2040,8 @@
     <dgm:cxn modelId="{7977E879-23AF-4355-88F6-CEC12AF3F17F}" srcId="{5A31DD65-6A23-4A96-8AA4-937C9F473A1B}" destId="{C4926E18-DEF9-424B-B2A9-F23898D34B72}" srcOrd="1" destOrd="0" parTransId="{885183CF-D81E-453D-ADF8-D2477BD1CAB5}" sibTransId="{1C982C65-B470-4FF5-8F70-DC848FE4139A}"/>
     <dgm:cxn modelId="{11E13666-A0C2-4C19-8FC8-471DEB618DD2}" type="presOf" srcId="{E0136D70-D16B-4F12-B33A-F946998B1887}" destId="{8C02EF4C-48DF-42A5-A40C-0F48C14E5256}" srcOrd="0" destOrd="0" presId="urn:microsoft.com/office/officeart/2005/8/layout/cycle2"/>
     <dgm:cxn modelId="{60813F41-66CD-4C67-851C-AC9F053ED22F}" type="presOf" srcId="{1692019D-9163-467C-8365-A7A5A70F0177}" destId="{9D315564-F76F-433C-958A-873B30D82F08}" srcOrd="0" destOrd="0" presId="urn:microsoft.com/office/officeart/2005/8/layout/cycle2"/>
+    <dgm:cxn modelId="{7C6A8688-DA83-459C-B34A-517B06E41478}" type="presOf" srcId="{5D1D4291-E7CD-40D6-AE96-87FFE6495F01}" destId="{AA7BBA46-3746-4402-8F12-8263CCD81017}" srcOrd="0" destOrd="0" presId="urn:microsoft.com/office/officeart/2005/8/layout/cycle2"/>
     <dgm:cxn modelId="{6A60EE44-C04D-4DCF-99DA-ABFEB0CB39F7}" type="presOf" srcId="{92E8EA80-B1B1-44FA-816B-39D877F416AC}" destId="{5B119983-4A13-4C5E-951C-AFFAB54D829A}" srcOrd="1" destOrd="0" presId="urn:microsoft.com/office/officeart/2005/8/layout/cycle2"/>
-    <dgm:cxn modelId="{7C6A8688-DA83-459C-B34A-517B06E41478}" type="presOf" srcId="{5D1D4291-E7CD-40D6-AE96-87FFE6495F01}" destId="{AA7BBA46-3746-4402-8F12-8263CCD81017}" srcOrd="0" destOrd="0" presId="urn:microsoft.com/office/officeart/2005/8/layout/cycle2"/>
     <dgm:cxn modelId="{7FBC1174-1CAC-48E2-B2A4-C556E0D41E7C}" type="presOf" srcId="{F22906F3-B47B-45B7-9B14-4FD8B8E8BBAE}" destId="{61F3795E-695C-44AC-8BA6-9B259FD3BC9C}" srcOrd="1" destOrd="0" presId="urn:microsoft.com/office/officeart/2005/8/layout/cycle2"/>
     <dgm:cxn modelId="{5448BA92-E3F2-445B-8AE8-5E736D9A5333}" type="presOf" srcId="{92E8EA80-B1B1-44FA-816B-39D877F416AC}" destId="{55BCCD0A-B83F-4063-9417-3F4A26376EB4}" srcOrd="0" destOrd="0" presId="urn:microsoft.com/office/officeart/2005/8/layout/cycle2"/>
     <dgm:cxn modelId="{D7BFFF2A-F9ED-49EC-9596-9907CCFB9868}" type="presOf" srcId="{D1411753-4EFD-4826-AF76-87EA7D8DB46B}" destId="{8A158840-F645-4D70-8E21-73D9E9FCD3A4}" srcOrd="0" destOrd="0" presId="urn:microsoft.com/office/officeart/2005/8/layout/cycle2"/>
@@ -5902,7 +5902,7 @@
           <a:p>
             <a:fld id="{51A22B42-34D3-4B01-BF3D-F69359E82423}" type="datetimeFigureOut">
               <a:rPr lang="en-US"/>
-              <a:t>11/27/2016</a:t>
+              <a:t>11/28/2016</a:t>
             </a:fld>
             <a:endParaRPr lang="en-US"/>
           </a:p>
@@ -6577,7 +6577,7 @@
             <a:fld id="{5586B75A-687E-405C-8A0B-8D00578BA2C3}" type="datetimeFigureOut">
               <a:rPr lang="en-US" dirty="0"/>
               <a:pPr/>
-              <a:t>11/27/2016</a:t>
+              <a:t>11/28/2016</a:t>
             </a:fld>
             <a:endParaRPr lang="en-US" dirty="0"/>
           </a:p>
@@ -6743,7 +6743,7 @@
           <a:p>
             <a:fld id="{5F4E5243-F52A-4D37-9694-EB26C6C31910}" type="datetimeFigureOut">
               <a:rPr lang="en-US" dirty="0"/>
-              <a:t>11/27/2016</a:t>
+              <a:t>11/28/2016</a:t>
             </a:fld>
             <a:endParaRPr lang="en-US" dirty="0"/>
           </a:p>
@@ -6918,7 +6918,7 @@
           <a:p>
             <a:fld id="{3A77B6E1-634A-48DC-9E8B-D894023267EF}" type="datetimeFigureOut">
               <a:rPr lang="en-US" dirty="0"/>
-              <a:t>11/27/2016</a:t>
+              <a:t>11/28/2016</a:t>
             </a:fld>
             <a:endParaRPr lang="en-US" dirty="0"/>
           </a:p>
@@ -7083,7 +7083,7 @@
           <a:p>
             <a:fld id="{7B2D3E9E-A95C-48F2-B4BF-A71542E0BE9A}" type="datetimeFigureOut">
               <a:rPr lang="en-US" dirty="0"/>
-              <a:t>11/27/2016</a:t>
+              <a:t>11/28/2016</a:t>
             </a:fld>
             <a:endParaRPr lang="en-US" dirty="0"/>
           </a:p>
@@ -7343,7 +7343,7 @@
             <a:fld id="{5586B75A-687E-405C-8A0B-8D00578BA2C3}" type="datetimeFigureOut">
               <a:rPr lang="en-US" dirty="0"/>
               <a:pPr/>
-              <a:t>11/27/2016</a:t>
+              <a:t>11/28/2016</a:t>
             </a:fld>
             <a:endParaRPr lang="en-US" dirty="0"/>
           </a:p>
@@ -7627,7 +7627,7 @@
           <a:p>
             <a:fld id="{F12952B5-7A2F-4CC8-B7CE-9234E21C2837}" type="datetimeFigureOut">
               <a:rPr lang="en-US" dirty="0"/>
-              <a:t>11/27/2016</a:t>
+              <a:t>11/28/2016</a:t>
             </a:fld>
             <a:endParaRPr lang="en-US" dirty="0"/>
           </a:p>
@@ -8051,7 +8051,7 @@
           <a:p>
             <a:fld id="{CE1DA07A-9201-4B4B-BAF2-015AFA30F520}" type="datetimeFigureOut">
               <a:rPr lang="en-US" dirty="0"/>
-              <a:t>11/27/2016</a:t>
+              <a:t>11/28/2016</a:t>
             </a:fld>
             <a:endParaRPr lang="en-US" dirty="0"/>
           </a:p>
@@ -8164,7 +8164,7 @@
           <a:p>
             <a:fld id="{73D7E00A-486F-4252-8B1D-E32645521F49}" type="datetimeFigureOut">
               <a:rPr lang="en-US" dirty="0"/>
-              <a:t>11/27/2016</a:t>
+              <a:t>11/28/2016</a:t>
             </a:fld>
             <a:endParaRPr lang="en-US" dirty="0"/>
           </a:p>
@@ -8254,7 +8254,7 @@
           <a:p>
             <a:fld id="{8DDF5F92-E675-4B36-9A60-69A962A68675}" type="datetimeFigureOut">
               <a:rPr lang="en-US" dirty="0"/>
-              <a:t>11/27/2016</a:t>
+              <a:t>11/28/2016</a:t>
             </a:fld>
             <a:endParaRPr lang="en-US" dirty="0"/>
           </a:p>
@@ -8605,7 +8605,7 @@
           <a:p>
             <a:fld id="{AF6E2C9B-5FA2-460D-9BE7-B0812FC2A6FF}" type="datetimeFigureOut">
               <a:rPr lang="en-US" dirty="0"/>
-              <a:t>11/27/2016</a:t>
+              <a:t>11/28/2016</a:t>
             </a:fld>
             <a:endParaRPr lang="en-US" dirty="0"/>
           </a:p>
@@ -8905,7 +8905,7 @@
             <a:fld id="{5586B75A-687E-405C-8A0B-8D00578BA2C3}" type="datetimeFigureOut">
               <a:rPr lang="en-US" dirty="0"/>
               <a:pPr/>
-              <a:t>11/27/2016</a:t>
+              <a:t>11/28/2016</a:t>
             </a:fld>
             <a:endParaRPr lang="en-US" dirty="0"/>
           </a:p>
@@ -9115,7 +9115,7 @@
             <a:fld id="{5586B75A-687E-405C-8A0B-8D00578BA2C3}" type="datetimeFigureOut">
               <a:rPr lang="en-US" dirty="0"/>
               <a:pPr/>
-              <a:t>11/27/2016</a:t>
+              <a:t>11/28/2016</a:t>
             </a:fld>
             <a:endParaRPr lang="en-US" dirty="0"/>
           </a:p>
@@ -9643,6 +9643,13 @@
   <p:clrMapOvr>
     <a:masterClrMapping/>
   </p:clrMapOvr>
+  <p:timing>
+    <p:tnLst>
+      <p:par>
+        <p:cTn id="1" dur="indefinite" restart="never" nodeType="tmRoot"/>
+      </p:par>
+    </p:tnLst>
+  </p:timing>
 </p:sld>
 </file>
 
@@ -9738,7 +9745,6 @@
               <a:rPr lang="en-US" dirty="0" smtClean="0"/>
               <a:t>major web browsers.</a:t>
             </a:r>
-            <a:endParaRPr lang="en-US" dirty="0" smtClean="0"/>
           </a:p>
         </p:txBody>
       </p:sp>
@@ -10444,6 +10450,13 @@
   <p:clrMapOvr>
     <a:masterClrMapping/>
   </p:clrMapOvr>
+  <p:timing>
+    <p:tnLst>
+      <p:par>
+        <p:cTn id="1" dur="indefinite" restart="never" nodeType="tmRoot"/>
+      </p:par>
+    </p:tnLst>
+  </p:timing>
 </p:sld>
 </file>
 
@@ -10588,6 +10601,13 @@
   <p:clrMapOvr>
     <a:masterClrMapping/>
   </p:clrMapOvr>
+  <p:timing>
+    <p:tnLst>
+      <p:par>
+        <p:cTn id="1" dur="indefinite" restart="never" nodeType="tmRoot"/>
+      </p:par>
+    </p:tnLst>
+  </p:timing>
 </p:sld>
 </file>
 
@@ -10625,7 +10645,7 @@
           <a:p>
             <a:r>
               <a:rPr lang="en-CA" dirty="0" smtClean="0"/>
-              <a:t>Want to Play Again?</a:t>
+              <a:t>Something for the Developers Too!</a:t>
             </a:r>
             <a:endParaRPr lang="en-CA" dirty="0"/>
           </a:p>
@@ -10659,17 +10679,8 @@
             </a:r>
             <a:r>
               <a:rPr lang="en-US" dirty="0" smtClean="0"/>
-              <a:t>Everyday is a new adventure with </a:t>
-            </a:r>
-            <a:r>
-              <a:rPr lang="en-US" dirty="0" err="1" smtClean="0"/>
-              <a:t>GrateBox</a:t>
-            </a:r>
-            <a:r>
-              <a:rPr lang="en-US" dirty="0"/>
-              <a:t>!</a:t>
-            </a:r>
-            <a:endParaRPr lang="en-US" dirty="0" smtClean="0"/>
+              <a:t>Interested in getting into Genetic Algorithms as a developer?</a:t>
+            </a:r>
           </a:p>
           <a:p>
             <a:pPr>
@@ -10685,7 +10696,15 @@
             </a:r>
             <a:r>
               <a:rPr lang="en-US" dirty="0" smtClean="0"/>
-              <a:t>The random nature of Genetic Algorithm allows for new cars to be generated with each generation.</a:t>
+              <a:t> </a:t>
+            </a:r>
+            <a:r>
+              <a:rPr lang="en-US" dirty="0" err="1" smtClean="0"/>
+              <a:t>GrateBox</a:t>
+            </a:r>
+            <a:r>
+              <a:rPr lang="en-US" dirty="0" smtClean="0"/>
+              <a:t> is meticulously documented so anyone can contribute to the ever-growing body of code.</a:t>
             </a:r>
           </a:p>
           <a:p>
@@ -10702,7 +10721,7 @@
             </a:r>
             <a:r>
               <a:rPr lang="en-US" dirty="0" smtClean="0"/>
-              <a:t> Every time you run the program, you’re bound to see new cars with new designs!</a:t>
+              <a:t> Our open source license allows anyone to modify, redistribute, and share the code.</a:t>
             </a:r>
             <a:endParaRPr lang="en-CA" dirty="0"/>
           </a:p>
@@ -10711,13 +10730,226 @@
     </p:spTree>
     <p:extLst>
       <p:ext uri="{BB962C8B-B14F-4D97-AF65-F5344CB8AC3E}">
-        <p14:creationId xmlns:p14="http://schemas.microsoft.com/office/powerpoint/2010/main" val="3053256050"/>
+        <p14:creationId xmlns:p14="http://schemas.microsoft.com/office/powerpoint/2010/main" val="1667083250"/>
       </p:ext>
     </p:extLst>
   </p:cSld>
   <p:clrMapOvr>
     <a:masterClrMapping/>
   </p:clrMapOvr>
+  <p:timing>
+    <p:tnLst>
+      <p:par>
+        <p:cTn id="1" dur="indefinite" restart="never" nodeType="tmRoot">
+          <p:childTnLst>
+            <p:seq concurrent="1" nextAc="seek">
+              <p:cTn id="2" dur="indefinite" nodeType="mainSeq">
+                <p:childTnLst>
+                  <p:par>
+                    <p:cTn id="3" fill="hold">
+                      <p:stCondLst>
+                        <p:cond delay="indefinite"/>
+                      </p:stCondLst>
+                      <p:childTnLst>
+                        <p:par>
+                          <p:cTn id="4" fill="hold">
+                            <p:stCondLst>
+                              <p:cond delay="0"/>
+                            </p:stCondLst>
+                            <p:childTnLst>
+                              <p:par>
+                                <p:cTn id="5" presetID="10" presetClass="entr" presetSubtype="0" fill="hold" nodeType="clickEffect">
+                                  <p:stCondLst>
+                                    <p:cond delay="0"/>
+                                  </p:stCondLst>
+                                  <p:childTnLst>
+                                    <p:set>
+                                      <p:cBhvr>
+                                        <p:cTn id="6" dur="1" fill="hold">
+                                          <p:stCondLst>
+                                            <p:cond delay="0"/>
+                                          </p:stCondLst>
+                                        </p:cTn>
+                                        <p:tgtEl>
+                                          <p:spTgt spid="3">
+                                            <p:txEl>
+                                              <p:pRg st="0" end="0"/>
+                                            </p:txEl>
+                                          </p:spTgt>
+                                        </p:tgtEl>
+                                        <p:attrNameLst>
+                                          <p:attrName>style.visibility</p:attrName>
+                                        </p:attrNameLst>
+                                      </p:cBhvr>
+                                      <p:to>
+                                        <p:strVal val="visible"/>
+                                      </p:to>
+                                    </p:set>
+                                    <p:animEffect transition="in" filter="fade">
+                                      <p:cBhvr>
+                                        <p:cTn id="7" dur="500"/>
+                                        <p:tgtEl>
+                                          <p:spTgt spid="3">
+                                            <p:txEl>
+                                              <p:pRg st="0" end="0"/>
+                                            </p:txEl>
+                                          </p:spTgt>
+                                        </p:tgtEl>
+                                      </p:cBhvr>
+                                    </p:animEffect>
+                                  </p:childTnLst>
+                                </p:cTn>
+                              </p:par>
+                            </p:childTnLst>
+                          </p:cTn>
+                        </p:par>
+                      </p:childTnLst>
+                    </p:cTn>
+                  </p:par>
+                  <p:par>
+                    <p:cTn id="8" fill="hold">
+                      <p:stCondLst>
+                        <p:cond delay="indefinite"/>
+                      </p:stCondLst>
+                      <p:childTnLst>
+                        <p:par>
+                          <p:cTn id="9" fill="hold">
+                            <p:stCondLst>
+                              <p:cond delay="0"/>
+                            </p:stCondLst>
+                            <p:childTnLst>
+                              <p:par>
+                                <p:cTn id="10" presetID="10" presetClass="entr" presetSubtype="0" fill="hold" nodeType="clickEffect">
+                                  <p:stCondLst>
+                                    <p:cond delay="0"/>
+                                  </p:stCondLst>
+                                  <p:childTnLst>
+                                    <p:set>
+                                      <p:cBhvr>
+                                        <p:cTn id="11" dur="1" fill="hold">
+                                          <p:stCondLst>
+                                            <p:cond delay="0"/>
+                                          </p:stCondLst>
+                                        </p:cTn>
+                                        <p:tgtEl>
+                                          <p:spTgt spid="3">
+                                            <p:txEl>
+                                              <p:pRg st="1" end="1"/>
+                                            </p:txEl>
+                                          </p:spTgt>
+                                        </p:tgtEl>
+                                        <p:attrNameLst>
+                                          <p:attrName>style.visibility</p:attrName>
+                                        </p:attrNameLst>
+                                      </p:cBhvr>
+                                      <p:to>
+                                        <p:strVal val="visible"/>
+                                      </p:to>
+                                    </p:set>
+                                    <p:animEffect transition="in" filter="fade">
+                                      <p:cBhvr>
+                                        <p:cTn id="12" dur="500"/>
+                                        <p:tgtEl>
+                                          <p:spTgt spid="3">
+                                            <p:txEl>
+                                              <p:pRg st="1" end="1"/>
+                                            </p:txEl>
+                                          </p:spTgt>
+                                        </p:tgtEl>
+                                      </p:cBhvr>
+                                    </p:animEffect>
+                                  </p:childTnLst>
+                                </p:cTn>
+                              </p:par>
+                            </p:childTnLst>
+                          </p:cTn>
+                        </p:par>
+                      </p:childTnLst>
+                    </p:cTn>
+                  </p:par>
+                  <p:par>
+                    <p:cTn id="13" fill="hold">
+                      <p:stCondLst>
+                        <p:cond delay="indefinite"/>
+                      </p:stCondLst>
+                      <p:childTnLst>
+                        <p:par>
+                          <p:cTn id="14" fill="hold">
+                            <p:stCondLst>
+                              <p:cond delay="0"/>
+                            </p:stCondLst>
+                            <p:childTnLst>
+                              <p:par>
+                                <p:cTn id="15" presetID="10" presetClass="entr" presetSubtype="0" fill="hold" nodeType="clickEffect">
+                                  <p:stCondLst>
+                                    <p:cond delay="0"/>
+                                  </p:stCondLst>
+                                  <p:childTnLst>
+                                    <p:set>
+                                      <p:cBhvr>
+                                        <p:cTn id="16" dur="1" fill="hold">
+                                          <p:stCondLst>
+                                            <p:cond delay="0"/>
+                                          </p:stCondLst>
+                                        </p:cTn>
+                                        <p:tgtEl>
+                                          <p:spTgt spid="3">
+                                            <p:txEl>
+                                              <p:pRg st="2" end="2"/>
+                                            </p:txEl>
+                                          </p:spTgt>
+                                        </p:tgtEl>
+                                        <p:attrNameLst>
+                                          <p:attrName>style.visibility</p:attrName>
+                                        </p:attrNameLst>
+                                      </p:cBhvr>
+                                      <p:to>
+                                        <p:strVal val="visible"/>
+                                      </p:to>
+                                    </p:set>
+                                    <p:animEffect transition="in" filter="fade">
+                                      <p:cBhvr>
+                                        <p:cTn id="17" dur="500"/>
+                                        <p:tgtEl>
+                                          <p:spTgt spid="3">
+                                            <p:txEl>
+                                              <p:pRg st="2" end="2"/>
+                                            </p:txEl>
+                                          </p:spTgt>
+                                        </p:tgtEl>
+                                      </p:cBhvr>
+                                    </p:animEffect>
+                                  </p:childTnLst>
+                                </p:cTn>
+                              </p:par>
+                            </p:childTnLst>
+                          </p:cTn>
+                        </p:par>
+                      </p:childTnLst>
+                    </p:cTn>
+                  </p:par>
+                </p:childTnLst>
+              </p:cTn>
+              <p:prevCondLst>
+                <p:cond evt="onPrev" delay="0">
+                  <p:tgtEl>
+                    <p:sldTgt/>
+                  </p:tgtEl>
+                </p:cond>
+              </p:prevCondLst>
+              <p:nextCondLst>
+                <p:cond evt="onNext" delay="0">
+                  <p:tgtEl>
+                    <p:sldTgt/>
+                  </p:tgtEl>
+                </p:cond>
+              </p:nextCondLst>
+            </p:seq>
+          </p:childTnLst>
+        </p:cTn>
+      </p:par>
+    </p:tnLst>
+  </p:timing>
 </p:sld>
 </file>
 
@@ -10755,7 +10987,7 @@
           <a:p>
             <a:r>
               <a:rPr lang="en-CA" dirty="0" smtClean="0"/>
-              <a:t>Something for the Developers Too!</a:t>
+              <a:t>Want to Play Again?</a:t>
             </a:r>
             <a:endParaRPr lang="en-CA" dirty="0"/>
           </a:p>
@@ -10789,8 +11021,17 @@
             </a:r>
             <a:r>
               <a:rPr lang="en-US" dirty="0" smtClean="0"/>
-              <a:t>Interested in getting into Genetic Algorithms as a developer?</a:t>
-            </a:r>
+              <a:t>Everyday is a new adventure with </a:t>
+            </a:r>
+            <a:r>
+              <a:rPr lang="en-US" dirty="0" err="1" smtClean="0"/>
+              <a:t>GrateBox</a:t>
+            </a:r>
+            <a:r>
+              <a:rPr lang="en-US" dirty="0"/>
+              <a:t>!</a:t>
+            </a:r>
+            <a:endParaRPr lang="en-US" dirty="0" smtClean="0"/>
           </a:p>
           <a:p>
             <a:pPr>
@@ -10806,15 +11047,7 @@
             </a:r>
             <a:r>
               <a:rPr lang="en-US" dirty="0" smtClean="0"/>
-              <a:t> </a:t>
-            </a:r>
-            <a:r>
-              <a:rPr lang="en-US" dirty="0" err="1" smtClean="0"/>
-              <a:t>GrateBox</a:t>
-            </a:r>
-            <a:r>
-              <a:rPr lang="en-US" dirty="0" smtClean="0"/>
-              <a:t> is meticulously documented so anyone can contribute to the ever-growing body of code.</a:t>
+              <a:t>The random nature of Genetic Algorithm allows for new cars to be generated with each generation.</a:t>
             </a:r>
           </a:p>
           <a:p>
@@ -10831,7 +11064,7 @@
             </a:r>
             <a:r>
               <a:rPr lang="en-US" dirty="0" smtClean="0"/>
-              <a:t> Our open source license allows anyone to modify, redistribute, and share the code.</a:t>
+              <a:t> Every time you run the program, you’re bound to see new cars with new designs!</a:t>
             </a:r>
             <a:endParaRPr lang="en-CA" dirty="0"/>
           </a:p>
@@ -10840,13 +11073,226 @@
     </p:spTree>
     <p:extLst>
       <p:ext uri="{BB962C8B-B14F-4D97-AF65-F5344CB8AC3E}">
-        <p14:creationId xmlns:p14="http://schemas.microsoft.com/office/powerpoint/2010/main" val="1667083250"/>
+        <p14:creationId xmlns:p14="http://schemas.microsoft.com/office/powerpoint/2010/main" val="3053256050"/>
       </p:ext>
     </p:extLst>
   </p:cSld>
   <p:clrMapOvr>
     <a:masterClrMapping/>
   </p:clrMapOvr>
+  <p:timing>
+    <p:tnLst>
+      <p:par>
+        <p:cTn id="1" dur="indefinite" restart="never" nodeType="tmRoot">
+          <p:childTnLst>
+            <p:seq concurrent="1" nextAc="seek">
+              <p:cTn id="2" dur="indefinite" nodeType="mainSeq">
+                <p:childTnLst>
+                  <p:par>
+                    <p:cTn id="3" fill="hold">
+                      <p:stCondLst>
+                        <p:cond delay="indefinite"/>
+                      </p:stCondLst>
+                      <p:childTnLst>
+                        <p:par>
+                          <p:cTn id="4" fill="hold">
+                            <p:stCondLst>
+                              <p:cond delay="0"/>
+                            </p:stCondLst>
+                            <p:childTnLst>
+                              <p:par>
+                                <p:cTn id="5" presetID="10" presetClass="entr" presetSubtype="0" fill="hold" nodeType="clickEffect">
+                                  <p:stCondLst>
+                                    <p:cond delay="0"/>
+                                  </p:stCondLst>
+                                  <p:childTnLst>
+                                    <p:set>
+                                      <p:cBhvr>
+                                        <p:cTn id="6" dur="1" fill="hold">
+                                          <p:stCondLst>
+                                            <p:cond delay="0"/>
+                                          </p:stCondLst>
+                                        </p:cTn>
+                                        <p:tgtEl>
+                                          <p:spTgt spid="3">
+                                            <p:txEl>
+                                              <p:pRg st="0" end="0"/>
+                                            </p:txEl>
+                                          </p:spTgt>
+                                        </p:tgtEl>
+                                        <p:attrNameLst>
+                                          <p:attrName>style.visibility</p:attrName>
+                                        </p:attrNameLst>
+                                      </p:cBhvr>
+                                      <p:to>
+                                        <p:strVal val="visible"/>
+                                      </p:to>
+                                    </p:set>
+                                    <p:animEffect transition="in" filter="fade">
+                                      <p:cBhvr>
+                                        <p:cTn id="7" dur="500"/>
+                                        <p:tgtEl>
+                                          <p:spTgt spid="3">
+                                            <p:txEl>
+                                              <p:pRg st="0" end="0"/>
+                                            </p:txEl>
+                                          </p:spTgt>
+                                        </p:tgtEl>
+                                      </p:cBhvr>
+                                    </p:animEffect>
+                                  </p:childTnLst>
+                                </p:cTn>
+                              </p:par>
+                            </p:childTnLst>
+                          </p:cTn>
+                        </p:par>
+                      </p:childTnLst>
+                    </p:cTn>
+                  </p:par>
+                  <p:par>
+                    <p:cTn id="8" fill="hold">
+                      <p:stCondLst>
+                        <p:cond delay="indefinite"/>
+                      </p:stCondLst>
+                      <p:childTnLst>
+                        <p:par>
+                          <p:cTn id="9" fill="hold">
+                            <p:stCondLst>
+                              <p:cond delay="0"/>
+                            </p:stCondLst>
+                            <p:childTnLst>
+                              <p:par>
+                                <p:cTn id="10" presetID="10" presetClass="entr" presetSubtype="0" fill="hold" nodeType="clickEffect">
+                                  <p:stCondLst>
+                                    <p:cond delay="0"/>
+                                  </p:stCondLst>
+                                  <p:childTnLst>
+                                    <p:set>
+                                      <p:cBhvr>
+                                        <p:cTn id="11" dur="1" fill="hold">
+                                          <p:stCondLst>
+                                            <p:cond delay="0"/>
+                                          </p:stCondLst>
+                                        </p:cTn>
+                                        <p:tgtEl>
+                                          <p:spTgt spid="3">
+                                            <p:txEl>
+                                              <p:pRg st="1" end="1"/>
+                                            </p:txEl>
+                                          </p:spTgt>
+                                        </p:tgtEl>
+                                        <p:attrNameLst>
+                                          <p:attrName>style.visibility</p:attrName>
+                                        </p:attrNameLst>
+                                      </p:cBhvr>
+                                      <p:to>
+                                        <p:strVal val="visible"/>
+                                      </p:to>
+                                    </p:set>
+                                    <p:animEffect transition="in" filter="fade">
+                                      <p:cBhvr>
+                                        <p:cTn id="12" dur="500"/>
+                                        <p:tgtEl>
+                                          <p:spTgt spid="3">
+                                            <p:txEl>
+                                              <p:pRg st="1" end="1"/>
+                                            </p:txEl>
+                                          </p:spTgt>
+                                        </p:tgtEl>
+                                      </p:cBhvr>
+                                    </p:animEffect>
+                                  </p:childTnLst>
+                                </p:cTn>
+                              </p:par>
+                            </p:childTnLst>
+                          </p:cTn>
+                        </p:par>
+                      </p:childTnLst>
+                    </p:cTn>
+                  </p:par>
+                  <p:par>
+                    <p:cTn id="13" fill="hold">
+                      <p:stCondLst>
+                        <p:cond delay="indefinite"/>
+                      </p:stCondLst>
+                      <p:childTnLst>
+                        <p:par>
+                          <p:cTn id="14" fill="hold">
+                            <p:stCondLst>
+                              <p:cond delay="0"/>
+                            </p:stCondLst>
+                            <p:childTnLst>
+                              <p:par>
+                                <p:cTn id="15" presetID="10" presetClass="entr" presetSubtype="0" fill="hold" nodeType="clickEffect">
+                                  <p:stCondLst>
+                                    <p:cond delay="0"/>
+                                  </p:stCondLst>
+                                  <p:childTnLst>
+                                    <p:set>
+                                      <p:cBhvr>
+                                        <p:cTn id="16" dur="1" fill="hold">
+                                          <p:stCondLst>
+                                            <p:cond delay="0"/>
+                                          </p:stCondLst>
+                                        </p:cTn>
+                                        <p:tgtEl>
+                                          <p:spTgt spid="3">
+                                            <p:txEl>
+                                              <p:pRg st="2" end="2"/>
+                                            </p:txEl>
+                                          </p:spTgt>
+                                        </p:tgtEl>
+                                        <p:attrNameLst>
+                                          <p:attrName>style.visibility</p:attrName>
+                                        </p:attrNameLst>
+                                      </p:cBhvr>
+                                      <p:to>
+                                        <p:strVal val="visible"/>
+                                      </p:to>
+                                    </p:set>
+                                    <p:animEffect transition="in" filter="fade">
+                                      <p:cBhvr>
+                                        <p:cTn id="17" dur="500"/>
+                                        <p:tgtEl>
+                                          <p:spTgt spid="3">
+                                            <p:txEl>
+                                              <p:pRg st="2" end="2"/>
+                                            </p:txEl>
+                                          </p:spTgt>
+                                        </p:tgtEl>
+                                      </p:cBhvr>
+                                    </p:animEffect>
+                                  </p:childTnLst>
+                                </p:cTn>
+                              </p:par>
+                            </p:childTnLst>
+                          </p:cTn>
+                        </p:par>
+                      </p:childTnLst>
+                    </p:cTn>
+                  </p:par>
+                </p:childTnLst>
+              </p:cTn>
+              <p:prevCondLst>
+                <p:cond evt="onPrev" delay="0">
+                  <p:tgtEl>
+                    <p:sldTgt/>
+                  </p:tgtEl>
+                </p:cond>
+              </p:prevCondLst>
+              <p:nextCondLst>
+                <p:cond evt="onNext" delay="0">
+                  <p:tgtEl>
+                    <p:sldTgt/>
+                  </p:tgtEl>
+                </p:cond>
+              </p:nextCondLst>
+            </p:seq>
+          </p:childTnLst>
+        </p:cTn>
+      </p:par>
+    </p:tnLst>
+  </p:timing>
 </p:sld>
 </file>
 
@@ -11419,6 +11865,187 @@
   <p:clrMapOvr>
     <a:masterClrMapping/>
   </p:clrMapOvr>
+  <p:timing>
+    <p:tnLst>
+      <p:par>
+        <p:cTn id="1" dur="indefinite" restart="never" nodeType="tmRoot">
+          <p:childTnLst>
+            <p:seq concurrent="1" nextAc="seek">
+              <p:cTn id="2" dur="indefinite" nodeType="mainSeq">
+                <p:childTnLst>
+                  <p:par>
+                    <p:cTn id="3" fill="hold">
+                      <p:stCondLst>
+                        <p:cond delay="indefinite"/>
+                      </p:stCondLst>
+                      <p:childTnLst>
+                        <p:par>
+                          <p:cTn id="4" fill="hold">
+                            <p:stCondLst>
+                              <p:cond delay="0"/>
+                            </p:stCondLst>
+                            <p:childTnLst>
+                              <p:par>
+                                <p:cTn id="5" presetID="10" presetClass="entr" presetSubtype="0" fill="hold" nodeType="clickEffect">
+                                  <p:stCondLst>
+                                    <p:cond delay="0"/>
+                                  </p:stCondLst>
+                                  <p:childTnLst>
+                                    <p:set>
+                                      <p:cBhvr>
+                                        <p:cTn id="6" dur="1" fill="hold">
+                                          <p:stCondLst>
+                                            <p:cond delay="0"/>
+                                          </p:stCondLst>
+                                        </p:cTn>
+                                        <p:tgtEl>
+                                          <p:spTgt spid="1026"/>
+                                        </p:tgtEl>
+                                        <p:attrNameLst>
+                                          <p:attrName>style.visibility</p:attrName>
+                                        </p:attrNameLst>
+                                      </p:cBhvr>
+                                      <p:to>
+                                        <p:strVal val="visible"/>
+                                      </p:to>
+                                    </p:set>
+                                    <p:animEffect transition="in" filter="fade">
+                                      <p:cBhvr>
+                                        <p:cTn id="7" dur="500"/>
+                                        <p:tgtEl>
+                                          <p:spTgt spid="1026"/>
+                                        </p:tgtEl>
+                                      </p:cBhvr>
+                                    </p:animEffect>
+                                  </p:childTnLst>
+                                </p:cTn>
+                              </p:par>
+                            </p:childTnLst>
+                          </p:cTn>
+                        </p:par>
+                      </p:childTnLst>
+                    </p:cTn>
+                  </p:par>
+                  <p:par>
+                    <p:cTn id="8" fill="hold">
+                      <p:stCondLst>
+                        <p:cond delay="indefinite"/>
+                      </p:stCondLst>
+                      <p:childTnLst>
+                        <p:par>
+                          <p:cTn id="9" fill="hold">
+                            <p:stCondLst>
+                              <p:cond delay="0"/>
+                            </p:stCondLst>
+                            <p:childTnLst>
+                              <p:par>
+                                <p:cTn id="10" presetID="1" presetClass="entr" presetSubtype="0" fill="hold" nodeType="clickEffect">
+                                  <p:stCondLst>
+                                    <p:cond delay="0"/>
+                                  </p:stCondLst>
+                                  <p:childTnLst>
+                                    <p:set>
+                                      <p:cBhvr>
+                                        <p:cTn id="11" dur="1" fill="hold">
+                                          <p:stCondLst>
+                                            <p:cond delay="0"/>
+                                          </p:stCondLst>
+                                        </p:cTn>
+                                        <p:tgtEl>
+                                          <p:spTgt spid="1028"/>
+                                        </p:tgtEl>
+                                        <p:attrNameLst>
+                                          <p:attrName>style.visibility</p:attrName>
+                                        </p:attrNameLst>
+                                      </p:cBhvr>
+                                      <p:to>
+                                        <p:strVal val="visible"/>
+                                      </p:to>
+                                    </p:set>
+                                  </p:childTnLst>
+                                </p:cTn>
+                              </p:par>
+                            </p:childTnLst>
+                          </p:cTn>
+                        </p:par>
+                      </p:childTnLst>
+                    </p:cTn>
+                  </p:par>
+                  <p:par>
+                    <p:cTn id="12" fill="hold">
+                      <p:stCondLst>
+                        <p:cond delay="indefinite"/>
+                      </p:stCondLst>
+                      <p:childTnLst>
+                        <p:par>
+                          <p:cTn id="13" fill="hold">
+                            <p:stCondLst>
+                              <p:cond delay="0"/>
+                            </p:stCondLst>
+                            <p:childTnLst>
+                              <p:par>
+                                <p:cTn id="14" presetID="10" presetClass="entr" presetSubtype="0" fill="hold" nodeType="clickEffect">
+                                  <p:stCondLst>
+                                    <p:cond delay="0"/>
+                                  </p:stCondLst>
+                                  <p:childTnLst>
+                                    <p:set>
+                                      <p:cBhvr>
+                                        <p:cTn id="15" dur="1" fill="hold">
+                                          <p:stCondLst>
+                                            <p:cond delay="0"/>
+                                          </p:stCondLst>
+                                        </p:cTn>
+                                        <p:tgtEl>
+                                          <p:spTgt spid="1030"/>
+                                        </p:tgtEl>
+                                        <p:attrNameLst>
+                                          <p:attrName>style.visibility</p:attrName>
+                                        </p:attrNameLst>
+                                      </p:cBhvr>
+                                      <p:to>
+                                        <p:strVal val="visible"/>
+                                      </p:to>
+                                    </p:set>
+                                    <p:animEffect transition="in" filter="fade">
+                                      <p:cBhvr>
+                                        <p:cTn id="16" dur="500"/>
+                                        <p:tgtEl>
+                                          <p:spTgt spid="1030"/>
+                                        </p:tgtEl>
+                                      </p:cBhvr>
+                                    </p:animEffect>
+                                  </p:childTnLst>
+                                </p:cTn>
+                              </p:par>
+                            </p:childTnLst>
+                          </p:cTn>
+                        </p:par>
+                      </p:childTnLst>
+                    </p:cTn>
+                  </p:par>
+                </p:childTnLst>
+              </p:cTn>
+              <p:prevCondLst>
+                <p:cond evt="onPrev" delay="0">
+                  <p:tgtEl>
+                    <p:sldTgt/>
+                  </p:tgtEl>
+                </p:cond>
+              </p:prevCondLst>
+              <p:nextCondLst>
+                <p:cond evt="onNext" delay="0">
+                  <p:tgtEl>
+                    <p:sldTgt/>
+                  </p:tgtEl>
+                </p:cond>
+              </p:nextCondLst>
+            </p:seq>
+          </p:childTnLst>
+        </p:cTn>
+      </p:par>
+    </p:tnLst>
+  </p:timing>
 </p:sld>
 </file>
 
@@ -11586,6 +12213,341 @@
   <p:clrMapOvr>
     <a:masterClrMapping/>
   </p:clrMapOvr>
+  <p:timing>
+    <p:tnLst>
+      <p:par>
+        <p:cTn id="1" dur="indefinite" restart="never" nodeType="tmRoot">
+          <p:childTnLst>
+            <p:seq concurrent="1" nextAc="seek">
+              <p:cTn id="2" dur="indefinite" nodeType="mainSeq">
+                <p:childTnLst>
+                  <p:par>
+                    <p:cTn id="3" fill="hold">
+                      <p:stCondLst>
+                        <p:cond delay="indefinite"/>
+                      </p:stCondLst>
+                      <p:childTnLst>
+                        <p:par>
+                          <p:cTn id="4" fill="hold">
+                            <p:stCondLst>
+                              <p:cond delay="0"/>
+                            </p:stCondLst>
+                            <p:childTnLst>
+                              <p:par>
+                                <p:cTn id="5" presetID="10" presetClass="entr" presetSubtype="0" fill="hold" nodeType="clickEffect">
+                                  <p:stCondLst>
+                                    <p:cond delay="0"/>
+                                  </p:stCondLst>
+                                  <p:childTnLst>
+                                    <p:set>
+                                      <p:cBhvr>
+                                        <p:cTn id="6" dur="1" fill="hold">
+                                          <p:stCondLst>
+                                            <p:cond delay="0"/>
+                                          </p:stCondLst>
+                                        </p:cTn>
+                                        <p:tgtEl>
+                                          <p:spTgt spid="3">
+                                            <p:txEl>
+                                              <p:pRg st="0" end="0"/>
+                                            </p:txEl>
+                                          </p:spTgt>
+                                        </p:tgtEl>
+                                        <p:attrNameLst>
+                                          <p:attrName>style.visibility</p:attrName>
+                                        </p:attrNameLst>
+                                      </p:cBhvr>
+                                      <p:to>
+                                        <p:strVal val="visible"/>
+                                      </p:to>
+                                    </p:set>
+                                    <p:animEffect transition="in" filter="fade">
+                                      <p:cBhvr>
+                                        <p:cTn id="7" dur="500"/>
+                                        <p:tgtEl>
+                                          <p:spTgt spid="3">
+                                            <p:txEl>
+                                              <p:pRg st="0" end="0"/>
+                                            </p:txEl>
+                                          </p:spTgt>
+                                        </p:tgtEl>
+                                      </p:cBhvr>
+                                    </p:animEffect>
+                                  </p:childTnLst>
+                                </p:cTn>
+                              </p:par>
+                            </p:childTnLst>
+                          </p:cTn>
+                        </p:par>
+                      </p:childTnLst>
+                    </p:cTn>
+                  </p:par>
+                  <p:par>
+                    <p:cTn id="8" fill="hold">
+                      <p:stCondLst>
+                        <p:cond delay="indefinite"/>
+                      </p:stCondLst>
+                      <p:childTnLst>
+                        <p:par>
+                          <p:cTn id="9" fill="hold">
+                            <p:stCondLst>
+                              <p:cond delay="0"/>
+                            </p:stCondLst>
+                            <p:childTnLst>
+                              <p:par>
+                                <p:cTn id="10" presetID="10" presetClass="entr" presetSubtype="0" fill="hold" nodeType="clickEffect">
+                                  <p:stCondLst>
+                                    <p:cond delay="0"/>
+                                  </p:stCondLst>
+                                  <p:childTnLst>
+                                    <p:set>
+                                      <p:cBhvr>
+                                        <p:cTn id="11" dur="1" fill="hold">
+                                          <p:stCondLst>
+                                            <p:cond delay="0"/>
+                                          </p:stCondLst>
+                                        </p:cTn>
+                                        <p:tgtEl>
+                                          <p:spTgt spid="3">
+                                            <p:txEl>
+                                              <p:pRg st="1" end="1"/>
+                                            </p:txEl>
+                                          </p:spTgt>
+                                        </p:tgtEl>
+                                        <p:attrNameLst>
+                                          <p:attrName>style.visibility</p:attrName>
+                                        </p:attrNameLst>
+                                      </p:cBhvr>
+                                      <p:to>
+                                        <p:strVal val="visible"/>
+                                      </p:to>
+                                    </p:set>
+                                    <p:animEffect transition="in" filter="fade">
+                                      <p:cBhvr>
+                                        <p:cTn id="12" dur="500"/>
+                                        <p:tgtEl>
+                                          <p:spTgt spid="3">
+                                            <p:txEl>
+                                              <p:pRg st="1" end="1"/>
+                                            </p:txEl>
+                                          </p:spTgt>
+                                        </p:tgtEl>
+                                      </p:cBhvr>
+                                    </p:animEffect>
+                                  </p:childTnLst>
+                                </p:cTn>
+                              </p:par>
+                            </p:childTnLst>
+                          </p:cTn>
+                        </p:par>
+                      </p:childTnLst>
+                    </p:cTn>
+                  </p:par>
+                  <p:par>
+                    <p:cTn id="13" fill="hold">
+                      <p:stCondLst>
+                        <p:cond delay="indefinite"/>
+                      </p:stCondLst>
+                      <p:childTnLst>
+                        <p:par>
+                          <p:cTn id="14" fill="hold">
+                            <p:stCondLst>
+                              <p:cond delay="0"/>
+                            </p:stCondLst>
+                            <p:childTnLst>
+                              <p:par>
+                                <p:cTn id="15" presetID="10" presetClass="entr" presetSubtype="0" fill="hold" nodeType="clickEffect">
+                                  <p:stCondLst>
+                                    <p:cond delay="0"/>
+                                  </p:stCondLst>
+                                  <p:childTnLst>
+                                    <p:set>
+                                      <p:cBhvr>
+                                        <p:cTn id="16" dur="1" fill="hold">
+                                          <p:stCondLst>
+                                            <p:cond delay="0"/>
+                                          </p:stCondLst>
+                                        </p:cTn>
+                                        <p:tgtEl>
+                                          <p:spTgt spid="3">
+                                            <p:txEl>
+                                              <p:pRg st="2" end="2"/>
+                                            </p:txEl>
+                                          </p:spTgt>
+                                        </p:tgtEl>
+                                        <p:attrNameLst>
+                                          <p:attrName>style.visibility</p:attrName>
+                                        </p:attrNameLst>
+                                      </p:cBhvr>
+                                      <p:to>
+                                        <p:strVal val="visible"/>
+                                      </p:to>
+                                    </p:set>
+                                    <p:animEffect transition="in" filter="fade">
+                                      <p:cBhvr>
+                                        <p:cTn id="17" dur="500"/>
+                                        <p:tgtEl>
+                                          <p:spTgt spid="3">
+                                            <p:txEl>
+                                              <p:pRg st="2" end="2"/>
+                                            </p:txEl>
+                                          </p:spTgt>
+                                        </p:tgtEl>
+                                      </p:cBhvr>
+                                    </p:animEffect>
+                                  </p:childTnLst>
+                                </p:cTn>
+                              </p:par>
+                            </p:childTnLst>
+                          </p:cTn>
+                        </p:par>
+                      </p:childTnLst>
+                    </p:cTn>
+                  </p:par>
+                  <p:par>
+                    <p:cTn id="18" fill="hold">
+                      <p:stCondLst>
+                        <p:cond delay="indefinite"/>
+                      </p:stCondLst>
+                      <p:childTnLst>
+                        <p:par>
+                          <p:cTn id="19" fill="hold">
+                            <p:stCondLst>
+                              <p:cond delay="0"/>
+                            </p:stCondLst>
+                            <p:childTnLst>
+                              <p:par>
+                                <p:cTn id="20" presetID="10" presetClass="entr" presetSubtype="0" fill="hold" nodeType="clickEffect">
+                                  <p:stCondLst>
+                                    <p:cond delay="0"/>
+                                  </p:stCondLst>
+                                  <p:childTnLst>
+                                    <p:set>
+                                      <p:cBhvr>
+                                        <p:cTn id="21" dur="1" fill="hold">
+                                          <p:stCondLst>
+                                            <p:cond delay="0"/>
+                                          </p:stCondLst>
+                                        </p:cTn>
+                                        <p:tgtEl>
+                                          <p:spTgt spid="3">
+                                            <p:txEl>
+                                              <p:pRg st="3" end="3"/>
+                                            </p:txEl>
+                                          </p:spTgt>
+                                        </p:tgtEl>
+                                        <p:attrNameLst>
+                                          <p:attrName>style.visibility</p:attrName>
+                                        </p:attrNameLst>
+                                      </p:cBhvr>
+                                      <p:to>
+                                        <p:strVal val="visible"/>
+                                      </p:to>
+                                    </p:set>
+                                    <p:animEffect transition="in" filter="fade">
+                                      <p:cBhvr>
+                                        <p:cTn id="22" dur="500"/>
+                                        <p:tgtEl>
+                                          <p:spTgt spid="3">
+                                            <p:txEl>
+                                              <p:pRg st="3" end="3"/>
+                                            </p:txEl>
+                                          </p:spTgt>
+                                        </p:tgtEl>
+                                      </p:cBhvr>
+                                    </p:animEffect>
+                                  </p:childTnLst>
+                                </p:cTn>
+                              </p:par>
+                            </p:childTnLst>
+                          </p:cTn>
+                        </p:par>
+                      </p:childTnLst>
+                    </p:cTn>
+                  </p:par>
+                  <p:par>
+                    <p:cTn id="23" fill="hold">
+                      <p:stCondLst>
+                        <p:cond delay="indefinite"/>
+                      </p:stCondLst>
+                      <p:childTnLst>
+                        <p:par>
+                          <p:cTn id="24" fill="hold">
+                            <p:stCondLst>
+                              <p:cond delay="0"/>
+                            </p:stCondLst>
+                            <p:childTnLst>
+                              <p:par>
+                                <p:cTn id="25" presetID="10" presetClass="entr" presetSubtype="0" fill="hold" nodeType="clickEffect">
+                                  <p:stCondLst>
+                                    <p:cond delay="0"/>
+                                  </p:stCondLst>
+                                  <p:childTnLst>
+                                    <p:set>
+                                      <p:cBhvr>
+                                        <p:cTn id="26" dur="1" fill="hold">
+                                          <p:stCondLst>
+                                            <p:cond delay="0"/>
+                                          </p:stCondLst>
+                                        </p:cTn>
+                                        <p:tgtEl>
+                                          <p:spTgt spid="3">
+                                            <p:txEl>
+                                              <p:pRg st="4" end="4"/>
+                                            </p:txEl>
+                                          </p:spTgt>
+                                        </p:tgtEl>
+                                        <p:attrNameLst>
+                                          <p:attrName>style.visibility</p:attrName>
+                                        </p:attrNameLst>
+                                      </p:cBhvr>
+                                      <p:to>
+                                        <p:strVal val="visible"/>
+                                      </p:to>
+                                    </p:set>
+                                    <p:animEffect transition="in" filter="fade">
+                                      <p:cBhvr>
+                                        <p:cTn id="27" dur="500"/>
+                                        <p:tgtEl>
+                                          <p:spTgt spid="3">
+                                            <p:txEl>
+                                              <p:pRg st="4" end="4"/>
+                                            </p:txEl>
+                                          </p:spTgt>
+                                        </p:tgtEl>
+                                      </p:cBhvr>
+                                    </p:animEffect>
+                                  </p:childTnLst>
+                                </p:cTn>
+                              </p:par>
+                            </p:childTnLst>
+                          </p:cTn>
+                        </p:par>
+                      </p:childTnLst>
+                    </p:cTn>
+                  </p:par>
+                </p:childTnLst>
+              </p:cTn>
+              <p:prevCondLst>
+                <p:cond evt="onPrev" delay="0">
+                  <p:tgtEl>
+                    <p:sldTgt/>
+                  </p:tgtEl>
+                </p:cond>
+              </p:prevCondLst>
+              <p:nextCondLst>
+                <p:cond evt="onNext" delay="0">
+                  <p:tgtEl>
+                    <p:sldTgt/>
+                  </p:tgtEl>
+                </p:cond>
+              </p:nextCondLst>
+            </p:seq>
+          </p:childTnLst>
+        </p:cTn>
+      </p:par>
+    </p:tnLst>
+  </p:timing>
 </p:sld>
 </file>
 
@@ -11661,11 +12623,11 @@
   <p:clrMapOvr>
     <a:masterClrMapping/>
   </p:clrMapOvr>
-  <mc:AlternateContent xmlns:mc="http://schemas.openxmlformats.org/markup-compatibility/2006">
-    <mc:Choice xmlns:p14="http://schemas.microsoft.com/office/powerpoint/2010/main" Requires="p14">
+  <mc:AlternateContent xmlns:mc="http://schemas.openxmlformats.org/markup-compatibility/2006" xmlns:p14="http://schemas.microsoft.com/office/powerpoint/2010/main">
+    <mc:Choice Requires="p14">
       <p:transition spd="slow" p14:dur="2000"/>
     </mc:Choice>
-    <mc:Fallback>
+    <mc:Fallback xmlns="">
       <p:transition spd="slow"/>
     </mc:Fallback>
   </mc:AlternateContent>
@@ -11713,11 +12675,7 @@
           <a:p>
             <a:r>
               <a:rPr lang="en-US" dirty="0" smtClean="0"/>
-              <a:t>Proof or </a:t>
-            </a:r>
-            <a:r>
-              <a:rPr lang="en-US" dirty="0" smtClean="0"/>
-              <a:t>It </a:t>
+              <a:t>Proof or It </a:t>
             </a:r>
             <a:r>
               <a:rPr lang="en-US" dirty="0" err="1" smtClean="0"/>
@@ -12093,6 +13051,13 @@
   <p:clrMapOvr>
     <a:masterClrMapping/>
   </p:clrMapOvr>
+  <p:timing>
+    <p:tnLst>
+      <p:par>
+        <p:cTn id="1" dur="indefinite" restart="never" nodeType="tmRoot"/>
+      </p:par>
+    </p:tnLst>
+  </p:timing>
 </p:sld>
 </file>
 
@@ -12345,6 +13310,13 @@
   <p:clrMapOvr>
     <a:masterClrMapping/>
   </p:clrMapOvr>
+  <p:timing>
+    <p:tnLst>
+      <p:par>
+        <p:cTn id="1" dur="indefinite" restart="never" nodeType="tmRoot"/>
+      </p:par>
+    </p:tnLst>
+  </p:timing>
 </p:sld>
 </file>
 
@@ -12430,13 +13402,8 @@
             </a:r>
             <a:r>
               <a:rPr lang="en-US" dirty="0" smtClean="0"/>
-              <a:t> major operating systems and </a:t>
-            </a:r>
-            <a:r>
-              <a:rPr lang="en-US" dirty="0" smtClean="0"/>
-              <a:t>platforms.</a:t>
-            </a:r>
-            <a:endParaRPr lang="en-US" dirty="0" smtClean="0"/>
+              <a:t> major operating systems and platforms.</a:t>
+            </a:r>
           </a:p>
         </p:txBody>
       </p:sp>
@@ -13286,7 +14253,7 @@
   <a:extraClrSchemeLst/>
   <a:extLst>
     <a:ext uri="{05A4C25C-085E-4340-85A3-A5531E510DB2}">
-      <thm15:themeFamily xmlns:thm15="http://schemas.microsoft.com/office/thememl/2012/main" xmlns="" name="Metropolitan" id="{4C5440D6-04D2-4954-96CF-F251137069B2}" vid="{9FF7CA0D-8839-4012-B51C-B152F9BD654A}"/>
+      <thm15:themeFamily xmlns="" xmlns:thm15="http://schemas.microsoft.com/office/thememl/2012/main" name="Metropolitan" id="{4C5440D6-04D2-4954-96CF-F251137069B2}" vid="{9FF7CA0D-8839-4012-B51C-B152F9BD654A}"/>
     </a:ext>
   </a:extLst>
 </a:theme>
@@ -13581,7 +14548,7 @@
   <a:extraClrSchemeLst/>
   <a:extLst>
     <a:ext uri="{05A4C25C-085E-4340-85A3-A5531E510DB2}">
-      <thm15:themeFamily xmlns:thm15="http://schemas.microsoft.com/office/thememl/2012/main" xmlns="" name="Office Theme" id="{62F939B6-93AF-4DB8-9C6B-D6C7DFDC589F}" vid="{4A3C46E8-61CC-4603-A589-7422A47A8E4A}"/>
+      <thm15:themeFamily xmlns="" xmlns:thm15="http://schemas.microsoft.com/office/thememl/2012/main" name="Office Theme" id="{62F939B6-93AF-4DB8-9C6B-D6C7DFDC589F}" vid="{4A3C46E8-61CC-4603-A589-7422A47A8E4A}"/>
     </a:ext>
   </a:extLst>
 </a:theme>

</xml_diff>

<commit_message>
Updated code for presentations
</commit_message>
<xml_diff>
--- a/Presentation.pptx
+++ b/Presentation.pptx
@@ -123,7 +123,7 @@
   </p:defaultTextStyle>
   <p:extLst>
     <p:ext uri="{EFAFB233-063F-42B5-8137-9DF3F51BA10A}">
-      <p15:sldGuideLst xmlns:p15="http://schemas.microsoft.com/office/powerpoint/2012/main" xmlns=""/>
+      <p15:sldGuideLst xmlns="" xmlns:p15="http://schemas.microsoft.com/office/powerpoint/2012/main"/>
     </p:ext>
   </p:extLst>
 </p:presentation>
@@ -2040,8 +2040,8 @@
     <dgm:cxn modelId="{7977E879-23AF-4355-88F6-CEC12AF3F17F}" srcId="{5A31DD65-6A23-4A96-8AA4-937C9F473A1B}" destId="{C4926E18-DEF9-424B-B2A9-F23898D34B72}" srcOrd="1" destOrd="0" parTransId="{885183CF-D81E-453D-ADF8-D2477BD1CAB5}" sibTransId="{1C982C65-B470-4FF5-8F70-DC848FE4139A}"/>
     <dgm:cxn modelId="{11E13666-A0C2-4C19-8FC8-471DEB618DD2}" type="presOf" srcId="{E0136D70-D16B-4F12-B33A-F946998B1887}" destId="{8C02EF4C-48DF-42A5-A40C-0F48C14E5256}" srcOrd="0" destOrd="0" presId="urn:microsoft.com/office/officeart/2005/8/layout/cycle2"/>
     <dgm:cxn modelId="{60813F41-66CD-4C67-851C-AC9F053ED22F}" type="presOf" srcId="{1692019D-9163-467C-8365-A7A5A70F0177}" destId="{9D315564-F76F-433C-958A-873B30D82F08}" srcOrd="0" destOrd="0" presId="urn:microsoft.com/office/officeart/2005/8/layout/cycle2"/>
+    <dgm:cxn modelId="{7C6A8688-DA83-459C-B34A-517B06E41478}" type="presOf" srcId="{5D1D4291-E7CD-40D6-AE96-87FFE6495F01}" destId="{AA7BBA46-3746-4402-8F12-8263CCD81017}" srcOrd="0" destOrd="0" presId="urn:microsoft.com/office/officeart/2005/8/layout/cycle2"/>
     <dgm:cxn modelId="{6A60EE44-C04D-4DCF-99DA-ABFEB0CB39F7}" type="presOf" srcId="{92E8EA80-B1B1-44FA-816B-39D877F416AC}" destId="{5B119983-4A13-4C5E-951C-AFFAB54D829A}" srcOrd="1" destOrd="0" presId="urn:microsoft.com/office/officeart/2005/8/layout/cycle2"/>
-    <dgm:cxn modelId="{7C6A8688-DA83-459C-B34A-517B06E41478}" type="presOf" srcId="{5D1D4291-E7CD-40D6-AE96-87FFE6495F01}" destId="{AA7BBA46-3746-4402-8F12-8263CCD81017}" srcOrd="0" destOrd="0" presId="urn:microsoft.com/office/officeart/2005/8/layout/cycle2"/>
     <dgm:cxn modelId="{7FBC1174-1CAC-48E2-B2A4-C556E0D41E7C}" type="presOf" srcId="{F22906F3-B47B-45B7-9B14-4FD8B8E8BBAE}" destId="{61F3795E-695C-44AC-8BA6-9B259FD3BC9C}" srcOrd="1" destOrd="0" presId="urn:microsoft.com/office/officeart/2005/8/layout/cycle2"/>
     <dgm:cxn modelId="{5448BA92-E3F2-445B-8AE8-5E736D9A5333}" type="presOf" srcId="{92E8EA80-B1B1-44FA-816B-39D877F416AC}" destId="{55BCCD0A-B83F-4063-9417-3F4A26376EB4}" srcOrd="0" destOrd="0" presId="urn:microsoft.com/office/officeart/2005/8/layout/cycle2"/>
     <dgm:cxn modelId="{D7BFFF2A-F9ED-49EC-9596-9907CCFB9868}" type="presOf" srcId="{D1411753-4EFD-4826-AF76-87EA7D8DB46B}" destId="{8A158840-F645-4D70-8E21-73D9E9FCD3A4}" srcOrd="0" destOrd="0" presId="urn:microsoft.com/office/officeart/2005/8/layout/cycle2"/>
@@ -5902,7 +5902,7 @@
           <a:p>
             <a:fld id="{51A22B42-34D3-4B01-BF3D-F69359E82423}" type="datetimeFigureOut">
               <a:rPr lang="en-US"/>
-              <a:t>11/28/2016</a:t>
+              <a:t>12/1/2016</a:t>
             </a:fld>
             <a:endParaRPr lang="en-US"/>
           </a:p>
@@ -6577,7 +6577,7 @@
             <a:fld id="{5586B75A-687E-405C-8A0B-8D00578BA2C3}" type="datetimeFigureOut">
               <a:rPr lang="en-US" dirty="0"/>
               <a:pPr/>
-              <a:t>11/28/2016</a:t>
+              <a:t>12/1/2016</a:t>
             </a:fld>
             <a:endParaRPr lang="en-US" dirty="0"/>
           </a:p>
@@ -6743,7 +6743,7 @@
           <a:p>
             <a:fld id="{5F4E5243-F52A-4D37-9694-EB26C6C31910}" type="datetimeFigureOut">
               <a:rPr lang="en-US" dirty="0"/>
-              <a:t>11/28/2016</a:t>
+              <a:t>12/1/2016</a:t>
             </a:fld>
             <a:endParaRPr lang="en-US" dirty="0"/>
           </a:p>
@@ -6918,7 +6918,7 @@
           <a:p>
             <a:fld id="{3A77B6E1-634A-48DC-9E8B-D894023267EF}" type="datetimeFigureOut">
               <a:rPr lang="en-US" dirty="0"/>
-              <a:t>11/28/2016</a:t>
+              <a:t>12/1/2016</a:t>
             </a:fld>
             <a:endParaRPr lang="en-US" dirty="0"/>
           </a:p>
@@ -7083,7 +7083,7 @@
           <a:p>
             <a:fld id="{7B2D3E9E-A95C-48F2-B4BF-A71542E0BE9A}" type="datetimeFigureOut">
               <a:rPr lang="en-US" dirty="0"/>
-              <a:t>11/28/2016</a:t>
+              <a:t>12/1/2016</a:t>
             </a:fld>
             <a:endParaRPr lang="en-US" dirty="0"/>
           </a:p>
@@ -7343,7 +7343,7 @@
             <a:fld id="{5586B75A-687E-405C-8A0B-8D00578BA2C3}" type="datetimeFigureOut">
               <a:rPr lang="en-US" dirty="0"/>
               <a:pPr/>
-              <a:t>11/28/2016</a:t>
+              <a:t>12/1/2016</a:t>
             </a:fld>
             <a:endParaRPr lang="en-US" dirty="0"/>
           </a:p>
@@ -7627,7 +7627,7 @@
           <a:p>
             <a:fld id="{F12952B5-7A2F-4CC8-B7CE-9234E21C2837}" type="datetimeFigureOut">
               <a:rPr lang="en-US" dirty="0"/>
-              <a:t>11/28/2016</a:t>
+              <a:t>12/1/2016</a:t>
             </a:fld>
             <a:endParaRPr lang="en-US" dirty="0"/>
           </a:p>
@@ -8051,7 +8051,7 @@
           <a:p>
             <a:fld id="{CE1DA07A-9201-4B4B-BAF2-015AFA30F520}" type="datetimeFigureOut">
               <a:rPr lang="en-US" dirty="0"/>
-              <a:t>11/28/2016</a:t>
+              <a:t>12/1/2016</a:t>
             </a:fld>
             <a:endParaRPr lang="en-US" dirty="0"/>
           </a:p>
@@ -8164,7 +8164,7 @@
           <a:p>
             <a:fld id="{73D7E00A-486F-4252-8B1D-E32645521F49}" type="datetimeFigureOut">
               <a:rPr lang="en-US" dirty="0"/>
-              <a:t>11/28/2016</a:t>
+              <a:t>12/1/2016</a:t>
             </a:fld>
             <a:endParaRPr lang="en-US" dirty="0"/>
           </a:p>
@@ -8254,7 +8254,7 @@
           <a:p>
             <a:fld id="{8DDF5F92-E675-4B36-9A60-69A962A68675}" type="datetimeFigureOut">
               <a:rPr lang="en-US" dirty="0"/>
-              <a:t>11/28/2016</a:t>
+              <a:t>12/1/2016</a:t>
             </a:fld>
             <a:endParaRPr lang="en-US" dirty="0"/>
           </a:p>
@@ -8605,7 +8605,7 @@
           <a:p>
             <a:fld id="{AF6E2C9B-5FA2-460D-9BE7-B0812FC2A6FF}" type="datetimeFigureOut">
               <a:rPr lang="en-US" dirty="0"/>
-              <a:t>11/28/2016</a:t>
+              <a:t>12/1/2016</a:t>
             </a:fld>
             <a:endParaRPr lang="en-US" dirty="0"/>
           </a:p>
@@ -8905,7 +8905,7 @@
             <a:fld id="{5586B75A-687E-405C-8A0B-8D00578BA2C3}" type="datetimeFigureOut">
               <a:rPr lang="en-US" dirty="0"/>
               <a:pPr/>
-              <a:t>11/28/2016</a:t>
+              <a:t>12/1/2016</a:t>
             </a:fld>
             <a:endParaRPr lang="en-US" dirty="0"/>
           </a:p>
@@ -9115,7 +9115,7 @@
             <a:fld id="{5586B75A-687E-405C-8A0B-8D00578BA2C3}" type="datetimeFigureOut">
               <a:rPr lang="en-US" dirty="0"/>
               <a:pPr/>
-              <a:t>11/28/2016</a:t>
+              <a:t>12/1/2016</a:t>
             </a:fld>
             <a:endParaRPr lang="en-US" dirty="0"/>
           </a:p>
@@ -10440,6 +10440,60 @@
           </a:p>
         </p:txBody>
       </p:sp>
+      <p:pic>
+        <p:nvPicPr>
+          <p:cNvPr id="1026" name="Picture 2"/>
+          <p:cNvPicPr>
+            <a:picLocks noChangeAspect="1" noChangeArrowheads="1"/>
+          </p:cNvPicPr>
+          <p:nvPr/>
+        </p:nvPicPr>
+        <p:blipFill>
+          <a:blip r:embed="rId2">
+            <a:extLst>
+              <a:ext uri="{28A0092B-C50C-407E-A947-70E740481C1C}">
+                <a14:useLocalDpi xmlns:a14="http://schemas.microsoft.com/office/drawing/2010/main" val="0"/>
+              </a:ext>
+            </a:extLst>
+          </a:blip>
+          <a:srcRect/>
+          <a:stretch>
+            <a:fillRect/>
+          </a:stretch>
+        </p:blipFill>
+        <p:spPr bwMode="auto">
+          <a:xfrm>
+            <a:off x="2209800" y="2679700"/>
+            <a:ext cx="6705600" cy="3771900"/>
+          </a:xfrm>
+          <a:prstGeom prst="rect">
+            <a:avLst/>
+          </a:prstGeom>
+          <a:noFill/>
+          <a:ln>
+            <a:noFill/>
+          </a:ln>
+          <a:extLst>
+            <a:ext uri="{909E8E84-426E-40DD-AFC4-6F175D3DCCD1}">
+              <a14:hiddenFill xmlns:a14="http://schemas.microsoft.com/office/drawing/2010/main">
+                <a:solidFill>
+                  <a:schemeClr val="accent1"/>
+                </a:solidFill>
+              </a14:hiddenFill>
+            </a:ext>
+            <a:ext uri="{91240B29-F687-4F45-9708-019B960494DF}">
+              <a14:hiddenLine xmlns:a14="http://schemas.microsoft.com/office/drawing/2010/main" w="9525">
+                <a:solidFill>
+                  <a:schemeClr val="tx1"/>
+                </a:solidFill>
+                <a:miter lim="800000"/>
+                <a:headEnd/>
+                <a:tailEnd/>
+              </a14:hiddenLine>
+            </a:ext>
+          </a:extLst>
+        </p:spPr>
+      </p:pic>
     </p:spTree>
     <p:extLst>
       <p:ext uri="{BB962C8B-B14F-4D97-AF65-F5344CB8AC3E}">
@@ -11047,15 +11101,7 @@
             </a:r>
             <a:r>
               <a:rPr lang="en-US" dirty="0" smtClean="0"/>
-              <a:t>The random nature of Genetic </a:t>
-            </a:r>
-            <a:r>
-              <a:rPr lang="en-US" dirty="0" smtClean="0"/>
-              <a:t>Algorithms allow </a:t>
-            </a:r>
-            <a:r>
-              <a:rPr lang="en-US" dirty="0" smtClean="0"/>
-              <a:t>for new cars to be generated with each generation.</a:t>
+              <a:t>The random nature of Genetic Algorithms allow for new cars to be generated with each generation.</a:t>
             </a:r>
           </a:p>
           <a:p>
@@ -11072,15 +11118,7 @@
             </a:r>
             <a:r>
               <a:rPr lang="en-US" dirty="0" smtClean="0"/>
-              <a:t> Every time you run the program, you’re bound to see new </a:t>
-            </a:r>
-            <a:r>
-              <a:rPr lang="en-US" dirty="0" smtClean="0"/>
-              <a:t>cars on with </a:t>
-            </a:r>
-            <a:r>
-              <a:rPr lang="en-US" dirty="0" smtClean="0"/>
-              <a:t>new designs!</a:t>
+              <a:t> Every time you run the program, you’re bound to see new cars on with new designs!</a:t>
             </a:r>
             <a:endParaRPr lang="en-CA" dirty="0"/>
           </a:p>
@@ -11346,7 +11384,7 @@
           <a:p>
             <a:r>
               <a:rPr lang="en-CA" dirty="0" smtClean="0"/>
-              <a:t>So, Let’s Play…</a:t>
+              <a:t>And so…</a:t>
             </a:r>
             <a:endParaRPr lang="en-CA" dirty="0"/>
           </a:p>
@@ -11427,7 +11465,91 @@
   <p:timing>
     <p:tnLst>
       <p:par>
-        <p:cTn id="1" dur="indefinite" restart="never" nodeType="tmRoot"/>
+        <p:cTn id="1" dur="indefinite" restart="never" nodeType="tmRoot">
+          <p:childTnLst>
+            <p:seq concurrent="1" nextAc="seek">
+              <p:cTn id="2" dur="indefinite" nodeType="mainSeq">
+                <p:childTnLst>
+                  <p:par>
+                    <p:cTn id="3" fill="hold">
+                      <p:stCondLst>
+                        <p:cond delay="indefinite"/>
+                      </p:stCondLst>
+                      <p:childTnLst>
+                        <p:par>
+                          <p:cTn id="4" fill="hold">
+                            <p:stCondLst>
+                              <p:cond delay="0"/>
+                            </p:stCondLst>
+                            <p:childTnLst>
+                              <p:par>
+                                <p:cTn id="5" presetID="10" presetClass="entr" presetSubtype="0" fill="hold" nodeType="clickEffect">
+                                  <p:stCondLst>
+                                    <p:cond delay="0"/>
+                                  </p:stCondLst>
+                                  <p:childTnLst>
+                                    <p:set>
+                                      <p:cBhvr>
+                                        <p:cTn id="6" dur="1" fill="hold">
+                                          <p:stCondLst>
+                                            <p:cond delay="0"/>
+                                          </p:stCondLst>
+                                        </p:cTn>
+                                        <p:tgtEl>
+                                          <p:spTgt spid="5">
+                                            <p:txEl>
+                                              <p:pRg st="0" end="0"/>
+                                            </p:txEl>
+                                          </p:spTgt>
+                                        </p:tgtEl>
+                                        <p:attrNameLst>
+                                          <p:attrName>style.visibility</p:attrName>
+                                        </p:attrNameLst>
+                                      </p:cBhvr>
+                                      <p:to>
+                                        <p:strVal val="visible"/>
+                                      </p:to>
+                                    </p:set>
+                                    <p:animEffect transition="in" filter="fade">
+                                      <p:cBhvr>
+                                        <p:cTn id="7" dur="500"/>
+                                        <p:tgtEl>
+                                          <p:spTgt spid="5">
+                                            <p:txEl>
+                                              <p:pRg st="0" end="0"/>
+                                            </p:txEl>
+                                          </p:spTgt>
+                                        </p:tgtEl>
+                                      </p:cBhvr>
+                                    </p:animEffect>
+                                  </p:childTnLst>
+                                </p:cTn>
+                              </p:par>
+                            </p:childTnLst>
+                          </p:cTn>
+                        </p:par>
+                      </p:childTnLst>
+                    </p:cTn>
+                  </p:par>
+                </p:childTnLst>
+              </p:cTn>
+              <p:prevCondLst>
+                <p:cond evt="onPrev" delay="0">
+                  <p:tgtEl>
+                    <p:sldTgt/>
+                  </p:tgtEl>
+                </p:cond>
+              </p:prevCondLst>
+              <p:nextCondLst>
+                <p:cond evt="onNext" delay="0">
+                  <p:tgtEl>
+                    <p:sldTgt/>
+                  </p:tgtEl>
+                </p:cond>
+              </p:nextCondLst>
+            </p:seq>
+          </p:childTnLst>
+        </p:cTn>
       </p:par>
     </p:tnLst>
   </p:timing>
@@ -12144,11 +12266,11 @@
   <p:clrMapOvr>
     <a:masterClrMapping/>
   </p:clrMapOvr>
-  <mc:AlternateContent xmlns:mc="http://schemas.openxmlformats.org/markup-compatibility/2006">
-    <mc:Choice xmlns:p14="http://schemas.microsoft.com/office/powerpoint/2010/main" Requires="p14">
+  <mc:AlternateContent xmlns:mc="http://schemas.openxmlformats.org/markup-compatibility/2006" xmlns:p14="http://schemas.microsoft.com/office/powerpoint/2010/main">
+    <mc:Choice Requires="p14">
       <p:transition spd="slow" p14:dur="2000"/>
     </mc:Choice>
-    <mc:Fallback>
+    <mc:Fallback xmlns="">
       <p:transition spd="slow"/>
     </mc:Fallback>
   </mc:AlternateContent>
@@ -12250,11 +12372,7 @@
             </a:r>
             <a:r>
               <a:rPr lang="en-CA" dirty="0" smtClean="0"/>
-              <a:t> </a:t>
-            </a:r>
-            <a:r>
-              <a:rPr lang="en-CA" dirty="0" smtClean="0"/>
-              <a:t>Genetic Cars by Rednhut.org</a:t>
+              <a:t> Genetic Cars by Rednhut.org</a:t>
             </a:r>
           </a:p>
           <a:p>
@@ -12271,15 +12389,7 @@
             </a:r>
             <a:r>
               <a:rPr lang="en-CA" dirty="0" smtClean="0"/>
-              <a:t>Genetic Cars is a </a:t>
-            </a:r>
-            <a:r>
-              <a:rPr lang="en-CA" dirty="0" smtClean="0"/>
-              <a:t>car simulation </a:t>
-            </a:r>
-            <a:r>
-              <a:rPr lang="en-CA" dirty="0" smtClean="0"/>
-              <a:t>designed to show the effects of a Genetic Algorithm over time.</a:t>
+              <a:t>Genetic Cars is a car simulation designed to show the effects of a Genetic Algorithm over time.</a:t>
             </a:r>
           </a:p>
           <a:p>
@@ -12309,15 +12419,7 @@
             </a:r>
             <a:r>
               <a:rPr lang="en-CA" dirty="0" smtClean="0"/>
-              <a:t>The cars that </a:t>
-            </a:r>
-            <a:r>
-              <a:rPr lang="en-CA" dirty="0" smtClean="0"/>
-              <a:t>get </a:t>
-            </a:r>
-            <a:r>
-              <a:rPr lang="en-CA" dirty="0" smtClean="0"/>
-              <a:t>the furthest are selected to produce the next generation of cars.</a:t>
+              <a:t>The cars that get the furthest are selected to produce the next generation of cars.</a:t>
             </a:r>
           </a:p>
           <a:p>
@@ -12745,15 +12847,7 @@
           <a:p>
             <a:r>
               <a:rPr lang="en-US" dirty="0" smtClean="0"/>
-              <a:t>“</a:t>
-            </a:r>
-            <a:r>
-              <a:rPr lang="en-US" dirty="0" smtClean="0"/>
-              <a:t>Don’t crash my browser!</a:t>
-            </a:r>
-            <a:r>
-              <a:rPr lang="en-US" dirty="0" smtClean="0"/>
-              <a:t>” – Anonymous Survey Respondent</a:t>
+              <a:t>“Don’t crash my browser!” – Anonymous Survey Respondent</a:t>
             </a:r>
             <a:endParaRPr lang="en-US" dirty="0"/>
           </a:p>
@@ -13449,11 +13543,7 @@
             </a:r>
             <a:r>
               <a:rPr lang="en-US" dirty="0" smtClean="0"/>
-              <a:t> </a:t>
-            </a:r>
-            <a:r>
-              <a:rPr lang="en-US" dirty="0" smtClean="0"/>
-              <a:t>major operating systems and platforms.</a:t>
+              <a:t> major operating systems and platforms.</a:t>
             </a:r>
           </a:p>
         </p:txBody>
@@ -14304,7 +14394,7 @@
   <a:extraClrSchemeLst/>
   <a:extLst>
     <a:ext uri="{05A4C25C-085E-4340-85A3-A5531E510DB2}">
-      <thm15:themeFamily xmlns:thm15="http://schemas.microsoft.com/office/thememl/2012/main" xmlns="" name="Metropolitan" id="{4C5440D6-04D2-4954-96CF-F251137069B2}" vid="{9FF7CA0D-8839-4012-B51C-B152F9BD654A}"/>
+      <thm15:themeFamily xmlns="" xmlns:thm15="http://schemas.microsoft.com/office/thememl/2012/main" name="Metropolitan" id="{4C5440D6-04D2-4954-96CF-F251137069B2}" vid="{9FF7CA0D-8839-4012-B51C-B152F9BD654A}"/>
     </a:ext>
   </a:extLst>
 </a:theme>
@@ -14599,7 +14689,7 @@
   <a:extraClrSchemeLst/>
   <a:extLst>
     <a:ext uri="{05A4C25C-085E-4340-85A3-A5531E510DB2}">
-      <thm15:themeFamily xmlns:thm15="http://schemas.microsoft.com/office/thememl/2012/main" xmlns="" name="Office Theme" id="{62F939B6-93AF-4DB8-9C6B-D6C7DFDC589F}" vid="{4A3C46E8-61CC-4603-A589-7422A47A8E4A}"/>
+      <thm15:themeFamily xmlns="" xmlns:thm15="http://schemas.microsoft.com/office/thememl/2012/main" name="Office Theme" id="{62F939B6-93AF-4DB8-9C6B-D6C7DFDC589F}" vid="{4A3C46E8-61CC-4603-A589-7422A47A8E4A}"/>
     </a:ext>
   </a:extLst>
 </a:theme>

</xml_diff>

<commit_message>
Made presentation more professional
</commit_message>
<xml_diff>
--- a/Presentation.pptx
+++ b/Presentation.pptx
@@ -123,7 +123,7 @@
   </p:defaultTextStyle>
   <p:extLst>
     <p:ext uri="{EFAFB233-063F-42B5-8137-9DF3F51BA10A}">
-      <p15:sldGuideLst xmlns="" xmlns:p15="http://schemas.microsoft.com/office/powerpoint/2012/main"/>
+      <p15:sldGuideLst xmlns:p15="http://schemas.microsoft.com/office/powerpoint/2012/main" xmlns=""/>
     </p:ext>
   </p:extLst>
 </p:presentation>
@@ -1683,7 +1683,7 @@
         <a:p>
           <a:r>
             <a:rPr lang="en-CA" dirty="0" smtClean="0"/>
-            <a:t>Mutate</a:t>
+            <a:t>Simulate</a:t>
           </a:r>
           <a:endParaRPr lang="en-CA" dirty="0"/>
         </a:p>
@@ -1720,7 +1720,7 @@
         <a:p>
           <a:r>
             <a:rPr lang="en-CA" dirty="0" smtClean="0"/>
-            <a:t>Simulate</a:t>
+            <a:t>Rank</a:t>
           </a:r>
           <a:endParaRPr lang="en-CA" dirty="0"/>
         </a:p>
@@ -1757,7 +1757,7 @@
         <a:p>
           <a:r>
             <a:rPr lang="en-CA" dirty="0" smtClean="0"/>
-            <a:t>Rank</a:t>
+            <a:t>Select</a:t>
           </a:r>
           <a:endParaRPr lang="en-CA" dirty="0"/>
         </a:p>
@@ -1794,7 +1794,7 @@
         <a:p>
           <a:r>
             <a:rPr lang="en-CA" dirty="0" smtClean="0"/>
-            <a:t>Select</a:t>
+            <a:t>Mutate</a:t>
           </a:r>
           <a:endParaRPr lang="en-CA" dirty="0"/>
         </a:p>
@@ -2040,8 +2040,8 @@
     <dgm:cxn modelId="{7977E879-23AF-4355-88F6-CEC12AF3F17F}" srcId="{5A31DD65-6A23-4A96-8AA4-937C9F473A1B}" destId="{C4926E18-DEF9-424B-B2A9-F23898D34B72}" srcOrd="1" destOrd="0" parTransId="{885183CF-D81E-453D-ADF8-D2477BD1CAB5}" sibTransId="{1C982C65-B470-4FF5-8F70-DC848FE4139A}"/>
     <dgm:cxn modelId="{11E13666-A0C2-4C19-8FC8-471DEB618DD2}" type="presOf" srcId="{E0136D70-D16B-4F12-B33A-F946998B1887}" destId="{8C02EF4C-48DF-42A5-A40C-0F48C14E5256}" srcOrd="0" destOrd="0" presId="urn:microsoft.com/office/officeart/2005/8/layout/cycle2"/>
     <dgm:cxn modelId="{60813F41-66CD-4C67-851C-AC9F053ED22F}" type="presOf" srcId="{1692019D-9163-467C-8365-A7A5A70F0177}" destId="{9D315564-F76F-433C-958A-873B30D82F08}" srcOrd="0" destOrd="0" presId="urn:microsoft.com/office/officeart/2005/8/layout/cycle2"/>
+    <dgm:cxn modelId="{6A60EE44-C04D-4DCF-99DA-ABFEB0CB39F7}" type="presOf" srcId="{92E8EA80-B1B1-44FA-816B-39D877F416AC}" destId="{5B119983-4A13-4C5E-951C-AFFAB54D829A}" srcOrd="1" destOrd="0" presId="urn:microsoft.com/office/officeart/2005/8/layout/cycle2"/>
     <dgm:cxn modelId="{7C6A8688-DA83-459C-B34A-517B06E41478}" type="presOf" srcId="{5D1D4291-E7CD-40D6-AE96-87FFE6495F01}" destId="{AA7BBA46-3746-4402-8F12-8263CCD81017}" srcOrd="0" destOrd="0" presId="urn:microsoft.com/office/officeart/2005/8/layout/cycle2"/>
-    <dgm:cxn modelId="{6A60EE44-C04D-4DCF-99DA-ABFEB0CB39F7}" type="presOf" srcId="{92E8EA80-B1B1-44FA-816B-39D877F416AC}" destId="{5B119983-4A13-4C5E-951C-AFFAB54D829A}" srcOrd="1" destOrd="0" presId="urn:microsoft.com/office/officeart/2005/8/layout/cycle2"/>
     <dgm:cxn modelId="{7FBC1174-1CAC-48E2-B2A4-C556E0D41E7C}" type="presOf" srcId="{F22906F3-B47B-45B7-9B14-4FD8B8E8BBAE}" destId="{61F3795E-695C-44AC-8BA6-9B259FD3BC9C}" srcOrd="1" destOrd="0" presId="urn:microsoft.com/office/officeart/2005/8/layout/cycle2"/>
     <dgm:cxn modelId="{5448BA92-E3F2-445B-8AE8-5E736D9A5333}" type="presOf" srcId="{92E8EA80-B1B1-44FA-816B-39D877F416AC}" destId="{55BCCD0A-B83F-4063-9417-3F4A26376EB4}" srcOrd="0" destOrd="0" presId="urn:microsoft.com/office/officeart/2005/8/layout/cycle2"/>
     <dgm:cxn modelId="{D7BFFF2A-F9ED-49EC-9596-9907CCFB9868}" type="presOf" srcId="{D1411753-4EFD-4826-AF76-87EA7D8DB46B}" destId="{8A158840-F645-4D70-8E21-73D9E9FCD3A4}" srcOrd="0" destOrd="0" presId="urn:microsoft.com/office/officeart/2005/8/layout/cycle2"/>
@@ -2571,7 +2571,7 @@
           </a:pPr>
           <a:r>
             <a:rPr lang="en-CA" sz="1900" kern="1200" dirty="0" smtClean="0"/>
-            <a:t>Mutate</a:t>
+            <a:t>Simulate</a:t>
           </a:r>
           <a:endParaRPr lang="en-CA" sz="1900" kern="1200" dirty="0"/>
         </a:p>
@@ -2717,7 +2717,7 @@
           </a:pPr>
           <a:r>
             <a:rPr lang="en-CA" sz="1900" kern="1200" dirty="0" smtClean="0"/>
-            <a:t>Simulate</a:t>
+            <a:t>Rank</a:t>
           </a:r>
           <a:endParaRPr lang="en-CA" sz="1900" kern="1200" dirty="0"/>
         </a:p>
@@ -2863,7 +2863,7 @@
           </a:pPr>
           <a:r>
             <a:rPr lang="en-CA" sz="1900" kern="1200" dirty="0" smtClean="0"/>
-            <a:t>Rank</a:t>
+            <a:t>Select</a:t>
           </a:r>
           <a:endParaRPr lang="en-CA" sz="1900" kern="1200" dirty="0"/>
         </a:p>
@@ -3009,7 +3009,7 @@
           </a:pPr>
           <a:r>
             <a:rPr lang="en-CA" sz="1900" kern="1200" dirty="0" smtClean="0"/>
-            <a:t>Select</a:t>
+            <a:t>Mutate</a:t>
           </a:r>
           <a:endParaRPr lang="en-CA" sz="1900" kern="1200" dirty="0"/>
         </a:p>
@@ -9590,6 +9590,10 @@
           <a:bodyPr/>
           <a:lstStyle/>
           <a:p>
+            <a:r>
+              <a:rPr lang="en-US" dirty="0" smtClean="0"/>
+              <a:t>Team 8</a:t>
+            </a:r>
             <a:endParaRPr lang="en-US" dirty="0" smtClean="0"/>
           </a:p>
         </p:txBody>
@@ -10781,6 +10785,47 @@
           </a:p>
         </p:txBody>
       </p:sp>
+      <p:pic>
+        <p:nvPicPr>
+          <p:cNvPr id="4" name="Picture 2" descr="Image result for open source"/>
+          <p:cNvPicPr>
+            <a:picLocks noChangeAspect="1" noChangeArrowheads="1"/>
+          </p:cNvPicPr>
+          <p:nvPr/>
+        </p:nvPicPr>
+        <p:blipFill>
+          <a:blip r:embed="rId2">
+            <a:extLst>
+              <a:ext uri="{28A0092B-C50C-407E-A947-70E740481C1C}">
+                <a14:useLocalDpi xmlns:a14="http://schemas.microsoft.com/office/drawing/2010/main" val="0"/>
+              </a:ext>
+            </a:extLst>
+          </a:blip>
+          <a:srcRect/>
+          <a:stretch>
+            <a:fillRect/>
+          </a:stretch>
+        </p:blipFill>
+        <p:spPr bwMode="auto">
+          <a:xfrm>
+            <a:off x="3517899" y="3852269"/>
+            <a:ext cx="5083175" cy="2653306"/>
+          </a:xfrm>
+          <a:prstGeom prst="rect">
+            <a:avLst/>
+          </a:prstGeom>
+          <a:noFill/>
+          <a:extLst>
+            <a:ext uri="{909E8E84-426E-40DD-AFC4-6F175D3DCCD1}">
+              <a14:hiddenFill xmlns:a14="http://schemas.microsoft.com/office/drawing/2010/main">
+                <a:solidFill>
+                  <a:srgbClr val="FFFFFF"/>
+                </a:solidFill>
+              </a14:hiddenFill>
+            </a:ext>
+          </a:extLst>
+        </p:spPr>
+      </p:pic>
     </p:spTree>
     <p:extLst>
       <p:ext uri="{BB962C8B-B14F-4D97-AF65-F5344CB8AC3E}">
@@ -10976,6 +11021,41 @@
                                   </p:childTnLst>
                                 </p:cTn>
                               </p:par>
+                              <p:par>
+                                <p:cTn id="18" presetID="10" presetClass="entr" presetSubtype="0" fill="hold" nodeType="withEffect">
+                                  <p:stCondLst>
+                                    <p:cond delay="0"/>
+                                  </p:stCondLst>
+                                  <p:childTnLst>
+                                    <p:set>
+                                      <p:cBhvr>
+                                        <p:cTn id="19" dur="1" fill="hold">
+                                          <p:stCondLst>
+                                            <p:cond delay="0"/>
+                                          </p:stCondLst>
+                                        </p:cTn>
+                                        <p:tgtEl>
+                                          <p:spTgt spid="4"/>
+                                        </p:tgtEl>
+                                        <p:attrNameLst>
+                                          <p:attrName>style.visibility</p:attrName>
+                                        </p:attrNameLst>
+                                      </p:cBhvr>
+                                      <p:to>
+                                        <p:strVal val="visible"/>
+                                      </p:to>
+                                    </p:set>
+                                    <p:animEffect transition="in" filter="fade">
+                                      <p:cBhvr>
+                                        <p:cTn id="20" dur="500"/>
+                                        <p:tgtEl>
+                                          <p:spTgt spid="4"/>
+                                        </p:tgtEl>
+                                      </p:cBhvr>
+                                    </p:animEffect>
+                                  </p:childTnLst>
+                                </p:cTn>
+                              </p:par>
                             </p:childTnLst>
                           </p:cTn>
                         </p:par>
@@ -11124,6 +11204,47 @@
           </a:p>
         </p:txBody>
       </p:sp>
+      <p:pic>
+        <p:nvPicPr>
+          <p:cNvPr id="1028" name="Picture 4" descr="Image result for play"/>
+          <p:cNvPicPr>
+            <a:picLocks noChangeAspect="1" noChangeArrowheads="1"/>
+          </p:cNvPicPr>
+          <p:nvPr/>
+        </p:nvPicPr>
+        <p:blipFill>
+          <a:blip r:embed="rId2">
+            <a:extLst>
+              <a:ext uri="{28A0092B-C50C-407E-A947-70E740481C1C}">
+                <a14:useLocalDpi xmlns:a14="http://schemas.microsoft.com/office/drawing/2010/main" val="0"/>
+              </a:ext>
+            </a:extLst>
+          </a:blip>
+          <a:srcRect/>
+          <a:stretch>
+            <a:fillRect/>
+          </a:stretch>
+        </p:blipFill>
+        <p:spPr bwMode="auto">
+          <a:xfrm>
+            <a:off x="4625975" y="3990975"/>
+            <a:ext cx="2438400" cy="2438400"/>
+          </a:xfrm>
+          <a:prstGeom prst="rect">
+            <a:avLst/>
+          </a:prstGeom>
+          <a:noFill/>
+          <a:extLst>
+            <a:ext uri="{909E8E84-426E-40DD-AFC4-6F175D3DCCD1}">
+              <a14:hiddenFill xmlns:a14="http://schemas.microsoft.com/office/drawing/2010/main">
+                <a:solidFill>
+                  <a:srgbClr val="FFFFFF"/>
+                </a:solidFill>
+              </a14:hiddenFill>
+            </a:ext>
+          </a:extLst>
+        </p:spPr>
+      </p:pic>
     </p:spTree>
     <p:extLst>
       <p:ext uri="{BB962C8B-B14F-4D97-AF65-F5344CB8AC3E}">
@@ -11319,6 +11440,41 @@
                                   </p:childTnLst>
                                 </p:cTn>
                               </p:par>
+                              <p:par>
+                                <p:cTn id="18" presetID="10" presetClass="entr" presetSubtype="0" fill="hold" nodeType="withEffect">
+                                  <p:stCondLst>
+                                    <p:cond delay="0"/>
+                                  </p:stCondLst>
+                                  <p:childTnLst>
+                                    <p:set>
+                                      <p:cBhvr>
+                                        <p:cTn id="19" dur="1" fill="hold">
+                                          <p:stCondLst>
+                                            <p:cond delay="0"/>
+                                          </p:stCondLst>
+                                        </p:cTn>
+                                        <p:tgtEl>
+                                          <p:spTgt spid="1028"/>
+                                        </p:tgtEl>
+                                        <p:attrNameLst>
+                                          <p:attrName>style.visibility</p:attrName>
+                                        </p:attrNameLst>
+                                      </p:cBhvr>
+                                      <p:to>
+                                        <p:strVal val="visible"/>
+                                      </p:to>
+                                    </p:set>
+                                    <p:animEffect transition="in" filter="fade">
+                                      <p:cBhvr>
+                                        <p:cTn id="20" dur="500"/>
+                                        <p:tgtEl>
+                                          <p:spTgt spid="1028"/>
+                                        </p:tgtEl>
+                                      </p:cBhvr>
+                                    </p:animEffect>
+                                  </p:childTnLst>
+                                </p:cTn>
+                              </p:par>
                             </p:childTnLst>
                           </p:cTn>
                         </p:par>
@@ -11641,23 +11797,20 @@
           <a:p>
             <a:pPr algn="ctr"/>
             <a:r>
-              <a:rPr lang="en-US" dirty="0" smtClean="0"/>
-              <a:t>Eric </a:t>
-            </a:r>
-            <a:r>
               <a:rPr lang="en-US" dirty="0" err="1" smtClean="0"/>
-              <a:t>Chaput</a:t>
+              <a:t>Jin</a:t>
             </a:r>
             <a:r>
               <a:rPr lang="en-US" dirty="0" smtClean="0"/>
-              <a:t>, </a:t>
+              <a:t> Liu</a:t>
             </a:r>
+            <a:endParaRPr lang="en-US" dirty="0" smtClean="0"/>
           </a:p>
           <a:p>
             <a:pPr algn="ctr"/>
             <a:r>
               <a:rPr lang="en-US" dirty="0" smtClean="0"/>
-              <a:t>Technical Evangelist</a:t>
+              <a:t>Code Ninja</a:t>
             </a:r>
             <a:endParaRPr lang="en-US" dirty="0"/>
           </a:p>
@@ -11716,8 +11869,13 @@
             <a:pPr algn="ctr"/>
             <a:r>
               <a:rPr lang="en-US" dirty="0" smtClean="0"/>
-              <a:t>Kelvin Lin,</a:t>
+              <a:t>Kelvin </a:t>
             </a:r>
+            <a:r>
+              <a:rPr lang="en-US" dirty="0" smtClean="0"/>
+              <a:t>Lin</a:t>
+            </a:r>
+            <a:endParaRPr lang="en-US" dirty="0" smtClean="0"/>
           </a:p>
           <a:p>
             <a:pPr algn="ctr"/>
@@ -11774,28 +11932,64 @@
           <a:p>
             <a:pPr algn="ctr"/>
             <a:r>
-              <a:rPr lang="en-US" dirty="0" err="1" smtClean="0"/>
-              <a:t>Jin</a:t>
+              <a:rPr lang="en-US" dirty="0" smtClean="0"/>
+              <a:t>Eric </a:t>
             </a:r>
             <a:r>
-              <a:rPr lang="en-US" dirty="0"/>
-              <a:t> </a:t>
+              <a:rPr lang="en-US" dirty="0" err="1" smtClean="0"/>
+              <a:t>Chaput</a:t>
             </a:r>
-            <a:r>
-              <a:rPr lang="en-US" dirty="0" smtClean="0"/>
-              <a:t>Liu,</a:t>
-            </a:r>
+            <a:endParaRPr lang="en-US" dirty="0" smtClean="0"/>
           </a:p>
           <a:p>
             <a:pPr algn="ctr"/>
             <a:r>
               <a:rPr lang="en-US" dirty="0" smtClean="0"/>
-              <a:t>Code Ninja</a:t>
+              <a:t>Technical Evangelist</a:t>
             </a:r>
             <a:endParaRPr lang="en-US" dirty="0"/>
           </a:p>
         </p:txBody>
       </p:sp>
+      <p:pic>
+        <p:nvPicPr>
+          <p:cNvPr id="3076" name="Picture 4" descr="https://scontent-yyz1-1.xx.fbcdn.net/v/t35.0-12/15064895_1525182984161893_585749578_o.jpg?oh=c5e24bd6550bd9e337ea1a5a15753eb5&amp;oe=5843114E"/>
+          <p:cNvPicPr>
+            <a:picLocks noChangeAspect="1" noChangeArrowheads="1"/>
+          </p:cNvPicPr>
+          <p:nvPr/>
+        </p:nvPicPr>
+        <p:blipFill rotWithShape="1">
+          <a:blip r:embed="rId3">
+            <a:extLst>
+              <a:ext uri="{28A0092B-C50C-407E-A947-70E740481C1C}">
+                <a14:useLocalDpi xmlns:a14="http://schemas.microsoft.com/office/drawing/2010/main" val="0"/>
+              </a:ext>
+            </a:extLst>
+          </a:blip>
+          <a:srcRect t="21276"/>
+          <a:stretch/>
+        </p:blipFill>
+        <p:spPr bwMode="auto">
+          <a:xfrm>
+            <a:off x="857250" y="1838997"/>
+            <a:ext cx="10788650" cy="2960016"/>
+          </a:xfrm>
+          <a:prstGeom prst="rect">
+            <a:avLst/>
+          </a:prstGeom>
+          <a:noFill/>
+          <a:extLst>
+            <a:ext uri="{909E8E84-426E-40DD-AFC4-6F175D3DCCD1}">
+              <a14:hiddenFill xmlns:a14="http://schemas.microsoft.com/office/drawing/2010/main">
+                <a:solidFill>
+                  <a:srgbClr val="FFFFFF"/>
+                </a:solidFill>
+              </a14:hiddenFill>
+            </a:ext>
+          </a:extLst>
+        </p:spPr>
+      </p:pic>
     </p:spTree>
     <p:extLst>
       <p:ext uri="{BB962C8B-B14F-4D97-AF65-F5344CB8AC3E}">
@@ -12241,7 +12435,7 @@
           <p:nvPr>
             <p:extLst>
               <p:ext uri="{D42A27DB-BD31-4B8C-83A1-F6EECF244321}">
-                <p14:modId xmlns:p14="http://schemas.microsoft.com/office/powerpoint/2010/main" val="3644522492"/>
+                <p14:modId xmlns:p14="http://schemas.microsoft.com/office/powerpoint/2010/main" val="3538511356"/>
               </p:ext>
             </p:extLst>
           </p:nvPr>
@@ -12846,8 +13040,8 @@
           <a:lstStyle/>
           <a:p>
             <a:r>
-              <a:rPr lang="en-US" dirty="0" smtClean="0"/>
-              <a:t>“Don’t crash my browser!” – Anonymous Survey Respondent</a:t>
+              <a:rPr lang="en-US" dirty="0"/>
+              <a:t>http://ugweb.cas.mcmaster.ca/~linkk4/</a:t>
             </a:r>
             <a:endParaRPr lang="en-US" dirty="0"/>
           </a:p>
@@ -13123,22 +13317,6 @@
           <a:bodyPr/>
           <a:lstStyle/>
           <a:p>
-            <a:r>
-              <a:rPr lang="en-US" dirty="0"/>
-              <a:t>“Don’t Be An Ass” – Eric </a:t>
-            </a:r>
-            <a:r>
-              <a:rPr lang="en-US" dirty="0" err="1"/>
-              <a:t>Chaput</a:t>
-            </a:r>
-            <a:r>
-              <a:rPr lang="en-US" dirty="0"/>
-              <a:t>, </a:t>
-            </a:r>
-            <a:r>
-              <a:rPr lang="en-US" dirty="0" smtClean="0"/>
-              <a:t>2016</a:t>
-            </a:r>
             <a:endParaRPr lang="en-US" dirty="0"/>
           </a:p>
         </p:txBody>
@@ -14394,7 +14572,7 @@
   <a:extraClrSchemeLst/>
   <a:extLst>
     <a:ext uri="{05A4C25C-085E-4340-85A3-A5531E510DB2}">
-      <thm15:themeFamily xmlns="" xmlns:thm15="http://schemas.microsoft.com/office/thememl/2012/main" name="Metropolitan" id="{4C5440D6-04D2-4954-96CF-F251137069B2}" vid="{9FF7CA0D-8839-4012-B51C-B152F9BD654A}"/>
+      <thm15:themeFamily xmlns:thm15="http://schemas.microsoft.com/office/thememl/2012/main" xmlns="" name="Metropolitan" id="{4C5440D6-04D2-4954-96CF-F251137069B2}" vid="{9FF7CA0D-8839-4012-B51C-B152F9BD654A}"/>
     </a:ext>
   </a:extLst>
 </a:theme>
@@ -14689,7 +14867,7 @@
   <a:extraClrSchemeLst/>
   <a:extLst>
     <a:ext uri="{05A4C25C-085E-4340-85A3-A5531E510DB2}">
-      <thm15:themeFamily xmlns="" xmlns:thm15="http://schemas.microsoft.com/office/thememl/2012/main" name="Office Theme" id="{62F939B6-93AF-4DB8-9C6B-D6C7DFDC589F}" vid="{4A3C46E8-61CC-4603-A589-7422A47A8E4A}"/>
+      <thm15:themeFamily xmlns:thm15="http://schemas.microsoft.com/office/thememl/2012/main" xmlns="" name="Office Theme" id="{62F939B6-93AF-4DB8-9C6B-D6C7DFDC589F}" vid="{4A3C46E8-61CC-4603-A589-7422A47A8E4A}"/>
     </a:ext>
   </a:extLst>
 </a:theme>

</xml_diff>

<commit_message>
Minor updates to presentation - improved images
</commit_message>
<xml_diff>
--- a/Presentation.pptx
+++ b/Presentation.pptx
@@ -123,7 +123,7 @@
   </p:defaultTextStyle>
   <p:extLst>
     <p:ext uri="{EFAFB233-063F-42B5-8137-9DF3F51BA10A}">
-      <p15:sldGuideLst xmlns:p15="http://schemas.microsoft.com/office/powerpoint/2012/main" xmlns=""/>
+      <p15:sldGuideLst xmlns="" xmlns:p15="http://schemas.microsoft.com/office/powerpoint/2012/main"/>
     </p:ext>
   </p:extLst>
 </p:presentation>
@@ -2040,8 +2040,8 @@
     <dgm:cxn modelId="{7977E879-23AF-4355-88F6-CEC12AF3F17F}" srcId="{5A31DD65-6A23-4A96-8AA4-937C9F473A1B}" destId="{C4926E18-DEF9-424B-B2A9-F23898D34B72}" srcOrd="1" destOrd="0" parTransId="{885183CF-D81E-453D-ADF8-D2477BD1CAB5}" sibTransId="{1C982C65-B470-4FF5-8F70-DC848FE4139A}"/>
     <dgm:cxn modelId="{11E13666-A0C2-4C19-8FC8-471DEB618DD2}" type="presOf" srcId="{E0136D70-D16B-4F12-B33A-F946998B1887}" destId="{8C02EF4C-48DF-42A5-A40C-0F48C14E5256}" srcOrd="0" destOrd="0" presId="urn:microsoft.com/office/officeart/2005/8/layout/cycle2"/>
     <dgm:cxn modelId="{60813F41-66CD-4C67-851C-AC9F053ED22F}" type="presOf" srcId="{1692019D-9163-467C-8365-A7A5A70F0177}" destId="{9D315564-F76F-433C-958A-873B30D82F08}" srcOrd="0" destOrd="0" presId="urn:microsoft.com/office/officeart/2005/8/layout/cycle2"/>
+    <dgm:cxn modelId="{7C6A8688-DA83-459C-B34A-517B06E41478}" type="presOf" srcId="{5D1D4291-E7CD-40D6-AE96-87FFE6495F01}" destId="{AA7BBA46-3746-4402-8F12-8263CCD81017}" srcOrd="0" destOrd="0" presId="urn:microsoft.com/office/officeart/2005/8/layout/cycle2"/>
     <dgm:cxn modelId="{6A60EE44-C04D-4DCF-99DA-ABFEB0CB39F7}" type="presOf" srcId="{92E8EA80-B1B1-44FA-816B-39D877F416AC}" destId="{5B119983-4A13-4C5E-951C-AFFAB54D829A}" srcOrd="1" destOrd="0" presId="urn:microsoft.com/office/officeart/2005/8/layout/cycle2"/>
-    <dgm:cxn modelId="{7C6A8688-DA83-459C-B34A-517B06E41478}" type="presOf" srcId="{5D1D4291-E7CD-40D6-AE96-87FFE6495F01}" destId="{AA7BBA46-3746-4402-8F12-8263CCD81017}" srcOrd="0" destOrd="0" presId="urn:microsoft.com/office/officeart/2005/8/layout/cycle2"/>
     <dgm:cxn modelId="{7FBC1174-1CAC-48E2-B2A4-C556E0D41E7C}" type="presOf" srcId="{F22906F3-B47B-45B7-9B14-4FD8B8E8BBAE}" destId="{61F3795E-695C-44AC-8BA6-9B259FD3BC9C}" srcOrd="1" destOrd="0" presId="urn:microsoft.com/office/officeart/2005/8/layout/cycle2"/>
     <dgm:cxn modelId="{5448BA92-E3F2-445B-8AE8-5E736D9A5333}" type="presOf" srcId="{92E8EA80-B1B1-44FA-816B-39D877F416AC}" destId="{55BCCD0A-B83F-4063-9417-3F4A26376EB4}" srcOrd="0" destOrd="0" presId="urn:microsoft.com/office/officeart/2005/8/layout/cycle2"/>
     <dgm:cxn modelId="{D7BFFF2A-F9ED-49EC-9596-9907CCFB9868}" type="presOf" srcId="{D1411753-4EFD-4826-AF76-87EA7D8DB46B}" destId="{8A158840-F645-4D70-8E21-73D9E9FCD3A4}" srcOrd="0" destOrd="0" presId="urn:microsoft.com/office/officeart/2005/8/layout/cycle2"/>
@@ -5902,7 +5902,7 @@
           <a:p>
             <a:fld id="{51A22B42-34D3-4B01-BF3D-F69359E82423}" type="datetimeFigureOut">
               <a:rPr lang="en-US"/>
-              <a:t>12/1/2016</a:t>
+              <a:t>12/2/2016</a:t>
             </a:fld>
             <a:endParaRPr lang="en-US"/>
           </a:p>
@@ -6577,7 +6577,7 @@
             <a:fld id="{5586B75A-687E-405C-8A0B-8D00578BA2C3}" type="datetimeFigureOut">
               <a:rPr lang="en-US" dirty="0"/>
               <a:pPr/>
-              <a:t>12/1/2016</a:t>
+              <a:t>12/2/2016</a:t>
             </a:fld>
             <a:endParaRPr lang="en-US" dirty="0"/>
           </a:p>
@@ -6743,7 +6743,7 @@
           <a:p>
             <a:fld id="{5F4E5243-F52A-4D37-9694-EB26C6C31910}" type="datetimeFigureOut">
               <a:rPr lang="en-US" dirty="0"/>
-              <a:t>12/1/2016</a:t>
+              <a:t>12/2/2016</a:t>
             </a:fld>
             <a:endParaRPr lang="en-US" dirty="0"/>
           </a:p>
@@ -6918,7 +6918,7 @@
           <a:p>
             <a:fld id="{3A77B6E1-634A-48DC-9E8B-D894023267EF}" type="datetimeFigureOut">
               <a:rPr lang="en-US" dirty="0"/>
-              <a:t>12/1/2016</a:t>
+              <a:t>12/2/2016</a:t>
             </a:fld>
             <a:endParaRPr lang="en-US" dirty="0"/>
           </a:p>
@@ -7083,7 +7083,7 @@
           <a:p>
             <a:fld id="{7B2D3E9E-A95C-48F2-B4BF-A71542E0BE9A}" type="datetimeFigureOut">
               <a:rPr lang="en-US" dirty="0"/>
-              <a:t>12/1/2016</a:t>
+              <a:t>12/2/2016</a:t>
             </a:fld>
             <a:endParaRPr lang="en-US" dirty="0"/>
           </a:p>
@@ -7343,7 +7343,7 @@
             <a:fld id="{5586B75A-687E-405C-8A0B-8D00578BA2C3}" type="datetimeFigureOut">
               <a:rPr lang="en-US" dirty="0"/>
               <a:pPr/>
-              <a:t>12/1/2016</a:t>
+              <a:t>12/2/2016</a:t>
             </a:fld>
             <a:endParaRPr lang="en-US" dirty="0"/>
           </a:p>
@@ -7627,7 +7627,7 @@
           <a:p>
             <a:fld id="{F12952B5-7A2F-4CC8-B7CE-9234E21C2837}" type="datetimeFigureOut">
               <a:rPr lang="en-US" dirty="0"/>
-              <a:t>12/1/2016</a:t>
+              <a:t>12/2/2016</a:t>
             </a:fld>
             <a:endParaRPr lang="en-US" dirty="0"/>
           </a:p>
@@ -8051,7 +8051,7 @@
           <a:p>
             <a:fld id="{CE1DA07A-9201-4B4B-BAF2-015AFA30F520}" type="datetimeFigureOut">
               <a:rPr lang="en-US" dirty="0"/>
-              <a:t>12/1/2016</a:t>
+              <a:t>12/2/2016</a:t>
             </a:fld>
             <a:endParaRPr lang="en-US" dirty="0"/>
           </a:p>
@@ -8164,7 +8164,7 @@
           <a:p>
             <a:fld id="{73D7E00A-486F-4252-8B1D-E32645521F49}" type="datetimeFigureOut">
               <a:rPr lang="en-US" dirty="0"/>
-              <a:t>12/1/2016</a:t>
+              <a:t>12/2/2016</a:t>
             </a:fld>
             <a:endParaRPr lang="en-US" dirty="0"/>
           </a:p>
@@ -8254,7 +8254,7 @@
           <a:p>
             <a:fld id="{8DDF5F92-E675-4B36-9A60-69A962A68675}" type="datetimeFigureOut">
               <a:rPr lang="en-US" dirty="0"/>
-              <a:t>12/1/2016</a:t>
+              <a:t>12/2/2016</a:t>
             </a:fld>
             <a:endParaRPr lang="en-US" dirty="0"/>
           </a:p>
@@ -8605,7 +8605,7 @@
           <a:p>
             <a:fld id="{AF6E2C9B-5FA2-460D-9BE7-B0812FC2A6FF}" type="datetimeFigureOut">
               <a:rPr lang="en-US" dirty="0"/>
-              <a:t>12/1/2016</a:t>
+              <a:t>12/2/2016</a:t>
             </a:fld>
             <a:endParaRPr lang="en-US" dirty="0"/>
           </a:p>
@@ -8905,7 +8905,7 @@
             <a:fld id="{5586B75A-687E-405C-8A0B-8D00578BA2C3}" type="datetimeFigureOut">
               <a:rPr lang="en-US" dirty="0"/>
               <a:pPr/>
-              <a:t>12/1/2016</a:t>
+              <a:t>12/2/2016</a:t>
             </a:fld>
             <a:endParaRPr lang="en-US" dirty="0"/>
           </a:p>
@@ -9115,7 +9115,7 @@
             <a:fld id="{5586B75A-687E-405C-8A0B-8D00578BA2C3}" type="datetimeFigureOut">
               <a:rPr lang="en-US" dirty="0"/>
               <a:pPr/>
-              <a:t>12/1/2016</a:t>
+              <a:t>12/2/2016</a:t>
             </a:fld>
             <a:endParaRPr lang="en-US" dirty="0"/>
           </a:p>
@@ -9594,7 +9594,6 @@
               <a:rPr lang="en-US" dirty="0" smtClean="0"/>
               <a:t>Team 8</a:t>
             </a:r>
-            <a:endParaRPr lang="en-US" dirty="0" smtClean="0"/>
           </a:p>
         </p:txBody>
       </p:sp>
@@ -10597,7 +10596,7 @@
       </p:sp>
       <p:pic>
         <p:nvPicPr>
-          <p:cNvPr id="5122" name="Picture 2"/>
+          <p:cNvPr id="1026" name="Picture 2"/>
           <p:cNvPicPr>
             <a:picLocks noChangeAspect="1" noChangeArrowheads="1"/>
           </p:cNvPicPr>
@@ -10618,8 +10617,8 @@
         </p:blipFill>
         <p:spPr bwMode="auto">
           <a:xfrm>
-            <a:off x="2965450" y="2967037"/>
-            <a:ext cx="6438900" cy="3438525"/>
+            <a:off x="2060575" y="2927350"/>
+            <a:ext cx="8020464" cy="3448050"/>
           </a:xfrm>
           <a:prstGeom prst="rect">
             <a:avLst/>
@@ -11804,7 +11803,6 @@
               <a:rPr lang="en-US" dirty="0" smtClean="0"/>
               <a:t> Liu</a:t>
             </a:r>
-            <a:endParaRPr lang="en-US" dirty="0" smtClean="0"/>
           </a:p>
           <a:p>
             <a:pPr algn="ctr"/>
@@ -11869,13 +11867,8 @@
             <a:pPr algn="ctr"/>
             <a:r>
               <a:rPr lang="en-US" dirty="0" smtClean="0"/>
-              <a:t>Kelvin </a:t>
+              <a:t>Kelvin Lin</a:t>
             </a:r>
-            <a:r>
-              <a:rPr lang="en-US" dirty="0" smtClean="0"/>
-              <a:t>Lin</a:t>
-            </a:r>
-            <a:endParaRPr lang="en-US" dirty="0" smtClean="0"/>
           </a:p>
           <a:p>
             <a:pPr algn="ctr"/>
@@ -13043,7 +13036,6 @@
               <a:rPr lang="en-US" dirty="0"/>
               <a:t>http://ugweb.cas.mcmaster.ca/~linkk4/</a:t>
             </a:r>
-            <a:endParaRPr lang="en-US" dirty="0"/>
           </a:p>
         </p:txBody>
       </p:sp>
@@ -14572,7 +14564,7 @@
   <a:extraClrSchemeLst/>
   <a:extLst>
     <a:ext uri="{05A4C25C-085E-4340-85A3-A5531E510DB2}">
-      <thm15:themeFamily xmlns:thm15="http://schemas.microsoft.com/office/thememl/2012/main" xmlns="" name="Metropolitan" id="{4C5440D6-04D2-4954-96CF-F251137069B2}" vid="{9FF7CA0D-8839-4012-B51C-B152F9BD654A}"/>
+      <thm15:themeFamily xmlns="" xmlns:thm15="http://schemas.microsoft.com/office/thememl/2012/main" name="Metropolitan" id="{4C5440D6-04D2-4954-96CF-F251137069B2}" vid="{9FF7CA0D-8839-4012-B51C-B152F9BD654A}"/>
     </a:ext>
   </a:extLst>
 </a:theme>
@@ -14867,7 +14859,7 @@
   <a:extraClrSchemeLst/>
   <a:extLst>
     <a:ext uri="{05A4C25C-085E-4340-85A3-A5531E510DB2}">
-      <thm15:themeFamily xmlns:thm15="http://schemas.microsoft.com/office/thememl/2012/main" xmlns="" name="Office Theme" id="{62F939B6-93AF-4DB8-9C6B-D6C7DFDC589F}" vid="{4A3C46E8-61CC-4603-A589-7422A47A8E4A}"/>
+      <thm15:themeFamily xmlns="" xmlns:thm15="http://schemas.microsoft.com/office/thememl/2012/main" name="Office Theme" id="{62F939B6-93AF-4DB8-9C6B-D6C7DFDC589F}" vid="{4A3C46E8-61CC-4603-A589-7422A47A8E4A}"/>
     </a:ext>
   </a:extLst>
 </a:theme>

</xml_diff>

<commit_message>
Made changes to presentation wording
</commit_message>
<xml_diff>
--- a/Presentation.pptx
+++ b/Presentation.pptx
@@ -123,7 +123,7 @@
   </p:defaultTextStyle>
   <p:extLst>
     <p:ext uri="{EFAFB233-063F-42B5-8137-9DF3F51BA10A}">
-      <p15:sldGuideLst xmlns="" xmlns:p15="http://schemas.microsoft.com/office/powerpoint/2012/main"/>
+      <p15:sldGuideLst xmlns:p15="http://schemas.microsoft.com/office/powerpoint/2012/main" xmlns=""/>
     </p:ext>
   </p:extLst>
 </p:presentation>
@@ -2040,8 +2040,8 @@
     <dgm:cxn modelId="{7977E879-23AF-4355-88F6-CEC12AF3F17F}" srcId="{5A31DD65-6A23-4A96-8AA4-937C9F473A1B}" destId="{C4926E18-DEF9-424B-B2A9-F23898D34B72}" srcOrd="1" destOrd="0" parTransId="{885183CF-D81E-453D-ADF8-D2477BD1CAB5}" sibTransId="{1C982C65-B470-4FF5-8F70-DC848FE4139A}"/>
     <dgm:cxn modelId="{11E13666-A0C2-4C19-8FC8-471DEB618DD2}" type="presOf" srcId="{E0136D70-D16B-4F12-B33A-F946998B1887}" destId="{8C02EF4C-48DF-42A5-A40C-0F48C14E5256}" srcOrd="0" destOrd="0" presId="urn:microsoft.com/office/officeart/2005/8/layout/cycle2"/>
     <dgm:cxn modelId="{60813F41-66CD-4C67-851C-AC9F053ED22F}" type="presOf" srcId="{1692019D-9163-467C-8365-A7A5A70F0177}" destId="{9D315564-F76F-433C-958A-873B30D82F08}" srcOrd="0" destOrd="0" presId="urn:microsoft.com/office/officeart/2005/8/layout/cycle2"/>
+    <dgm:cxn modelId="{6A60EE44-C04D-4DCF-99DA-ABFEB0CB39F7}" type="presOf" srcId="{92E8EA80-B1B1-44FA-816B-39D877F416AC}" destId="{5B119983-4A13-4C5E-951C-AFFAB54D829A}" srcOrd="1" destOrd="0" presId="urn:microsoft.com/office/officeart/2005/8/layout/cycle2"/>
     <dgm:cxn modelId="{7C6A8688-DA83-459C-B34A-517B06E41478}" type="presOf" srcId="{5D1D4291-E7CD-40D6-AE96-87FFE6495F01}" destId="{AA7BBA46-3746-4402-8F12-8263CCD81017}" srcOrd="0" destOrd="0" presId="urn:microsoft.com/office/officeart/2005/8/layout/cycle2"/>
-    <dgm:cxn modelId="{6A60EE44-C04D-4DCF-99DA-ABFEB0CB39F7}" type="presOf" srcId="{92E8EA80-B1B1-44FA-816B-39D877F416AC}" destId="{5B119983-4A13-4C5E-951C-AFFAB54D829A}" srcOrd="1" destOrd="0" presId="urn:microsoft.com/office/officeart/2005/8/layout/cycle2"/>
     <dgm:cxn modelId="{7FBC1174-1CAC-48E2-B2A4-C556E0D41E7C}" type="presOf" srcId="{F22906F3-B47B-45B7-9B14-4FD8B8E8BBAE}" destId="{61F3795E-695C-44AC-8BA6-9B259FD3BC9C}" srcOrd="1" destOrd="0" presId="urn:microsoft.com/office/officeart/2005/8/layout/cycle2"/>
     <dgm:cxn modelId="{5448BA92-E3F2-445B-8AE8-5E736D9A5333}" type="presOf" srcId="{92E8EA80-B1B1-44FA-816B-39D877F416AC}" destId="{55BCCD0A-B83F-4063-9417-3F4A26376EB4}" srcOrd="0" destOrd="0" presId="urn:microsoft.com/office/officeart/2005/8/layout/cycle2"/>
     <dgm:cxn modelId="{D7BFFF2A-F9ED-49EC-9596-9907CCFB9868}" type="presOf" srcId="{D1411753-4EFD-4826-AF76-87EA7D8DB46B}" destId="{8A158840-F645-4D70-8E21-73D9E9FCD3A4}" srcOrd="0" destOrd="0" presId="urn:microsoft.com/office/officeart/2005/8/layout/cycle2"/>
@@ -10589,8 +10589,13 @@
             </a:r>
             <a:r>
               <a:rPr lang="en-CA" dirty="0" smtClean="0"/>
-              <a:t> 3/3 for overall user experience.</a:t>
+              <a:t> 3/3 for overall </a:t>
             </a:r>
+            <a:r>
+              <a:rPr lang="en-CA" dirty="0" smtClean="0"/>
+              <a:t>simplicity.</a:t>
+            </a:r>
+            <a:endParaRPr lang="en-CA" dirty="0" smtClean="0"/>
           </a:p>
         </p:txBody>
       </p:sp>
@@ -10617,8 +10622,8 @@
         </p:blipFill>
         <p:spPr bwMode="auto">
           <a:xfrm>
-            <a:off x="2060575" y="2927350"/>
-            <a:ext cx="8020464" cy="3448050"/>
+            <a:off x="1438275" y="2578100"/>
+            <a:ext cx="8832850" cy="3797300"/>
           </a:xfrm>
           <a:prstGeom prst="rect">
             <a:avLst/>
@@ -14564,7 +14569,7 @@
   <a:extraClrSchemeLst/>
   <a:extLst>
     <a:ext uri="{05A4C25C-085E-4340-85A3-A5531E510DB2}">
-      <thm15:themeFamily xmlns="" xmlns:thm15="http://schemas.microsoft.com/office/thememl/2012/main" name="Metropolitan" id="{4C5440D6-04D2-4954-96CF-F251137069B2}" vid="{9FF7CA0D-8839-4012-B51C-B152F9BD654A}"/>
+      <thm15:themeFamily xmlns:thm15="http://schemas.microsoft.com/office/thememl/2012/main" xmlns="" name="Metropolitan" id="{4C5440D6-04D2-4954-96CF-F251137069B2}" vid="{9FF7CA0D-8839-4012-B51C-B152F9BD654A}"/>
     </a:ext>
   </a:extLst>
 </a:theme>
@@ -14859,7 +14864,7 @@
   <a:extraClrSchemeLst/>
   <a:extLst>
     <a:ext uri="{05A4C25C-085E-4340-85A3-A5531E510DB2}">
-      <thm15:themeFamily xmlns="" xmlns:thm15="http://schemas.microsoft.com/office/thememl/2012/main" name="Office Theme" id="{62F939B6-93AF-4DB8-9C6B-D6C7DFDC589F}" vid="{4A3C46E8-61CC-4603-A589-7422A47A8E4A}"/>
+      <thm15:themeFamily xmlns:thm15="http://schemas.microsoft.com/office/thememl/2012/main" xmlns="" name="Office Theme" id="{62F939B6-93AF-4DB8-9C6B-D6C7DFDC589F}" vid="{4A3C46E8-61CC-4603-A589-7422A47A8E4A}"/>
     </a:ext>
   </a:extLst>
 </a:theme>

</xml_diff>